<commit_message>
updated directions and file structure
</commit_message>
<xml_diff>
--- a/website_tutorial_beginner.pptx
+++ b/website_tutorial_beginner.pptx
@@ -1,20 +1,27 @@
 
 <file path=ppt/presentation.xml><?xml version="1.0" encoding="utf-8"?>
-<p:presentation xmlns:a="http://schemas.openxmlformats.org/drawingml/2006/main" xmlns:r="http://schemas.openxmlformats.org/officeDocument/2006/relationships" xmlns:p="http://schemas.openxmlformats.org/presentationml/2006/main" autoCompressPictures="0">
+<p:presentation xmlns:a="http://schemas.openxmlformats.org/drawingml/2006/main" xmlns:r="http://schemas.openxmlformats.org/officeDocument/2006/relationships" xmlns:p="http://schemas.openxmlformats.org/presentationml/2006/main" showSpecialPlsOnTitleSld="0" autoCompressPictures="0">
   <p:sldMasterIdLst>
     <p:sldMasterId id="2147483648" r:id="rId1"/>
   </p:sldMasterIdLst>
+  <p:notesMasterIdLst>
+    <p:notesMasterId r:id="rId16"/>
+  </p:notesMasterIdLst>
   <p:sldIdLst>
     <p:sldId id="256" r:id="rId2"/>
     <p:sldId id="257" r:id="rId3"/>
     <p:sldId id="260" r:id="rId4"/>
     <p:sldId id="262" r:id="rId5"/>
     <p:sldId id="263" r:id="rId6"/>
-    <p:sldId id="259" r:id="rId7"/>
-    <p:sldId id="264" r:id="rId8"/>
-    <p:sldId id="265" r:id="rId9"/>
-    <p:sldId id="261" r:id="rId10"/>
-    <p:sldId id="258" r:id="rId11"/>
+    <p:sldId id="266" r:id="rId7"/>
+    <p:sldId id="259" r:id="rId8"/>
+    <p:sldId id="268" r:id="rId9"/>
+    <p:sldId id="269" r:id="rId10"/>
+    <p:sldId id="267" r:id="rId11"/>
+    <p:sldId id="264" r:id="rId12"/>
+    <p:sldId id="265" r:id="rId13"/>
+    <p:sldId id="261" r:id="rId14"/>
+    <p:sldId id="258" r:id="rId15"/>
   </p:sldIdLst>
   <p:sldSz cx="12192000" cy="6858000"/>
   <p:notesSz cx="6858000" cy="9144000"/>
@@ -121,8 +128,353 @@
 </p:presentation>
 </file>
 
-<file path=ppt/revisionInfo.xml><?xml version="1.0" encoding="utf-8"?>
-<p1510:revInfo xmlns:a="http://schemas.openxmlformats.org/drawingml/2006/main" xmlns:r="http://schemas.openxmlformats.org/officeDocument/2006/relationships" xmlns:p1510="http://schemas.microsoft.com/office/powerpoint/2015/10/main"/>
+<file path=ppt/notesMasters/notesMaster1.xml><?xml version="1.0" encoding="utf-8"?>
+<p:notesMaster xmlns:a="http://schemas.openxmlformats.org/drawingml/2006/main" xmlns:r="http://schemas.openxmlformats.org/officeDocument/2006/relationships" xmlns:p="http://schemas.openxmlformats.org/presentationml/2006/main">
+  <p:cSld>
+    <p:bg>
+      <p:bgRef idx="1001">
+        <a:schemeClr val="bg1"/>
+      </p:bgRef>
+    </p:bg>
+    <p:spTree>
+      <p:nvGrpSpPr>
+        <p:cNvPr id="1" name=""/>
+        <p:cNvGrpSpPr/>
+        <p:nvPr/>
+      </p:nvGrpSpPr>
+      <p:grpSpPr>
+        <a:xfrm>
+          <a:off x="0" y="0"/>
+          <a:ext cx="0" cy="0"/>
+          <a:chOff x="0" y="0"/>
+          <a:chExt cx="0" cy="0"/>
+        </a:xfrm>
+      </p:grpSpPr>
+      <p:sp>
+        <p:nvSpPr>
+          <p:cNvPr id="2" name="Header Placeholder 1"/>
+          <p:cNvSpPr>
+            <a:spLocks noGrp="1"/>
+          </p:cNvSpPr>
+          <p:nvPr>
+            <p:ph type="hdr" sz="quarter"/>
+          </p:nvPr>
+        </p:nvSpPr>
+        <p:spPr>
+          <a:xfrm>
+            <a:off x="0" y="0"/>
+            <a:ext cx="2971800" cy="458788"/>
+          </a:xfrm>
+          <a:prstGeom prst="rect">
+            <a:avLst/>
+          </a:prstGeom>
+        </p:spPr>
+        <p:txBody>
+          <a:bodyPr vert="horz" lIns="91440" tIns="45720" rIns="91440" bIns="45720" rtlCol="0"/>
+          <a:lstStyle>
+            <a:lvl1pPr algn="l">
+              <a:defRPr sz="1200"/>
+            </a:lvl1pPr>
+          </a:lstStyle>
+          <a:p>
+            <a:endParaRPr lang="en-US"/>
+          </a:p>
+        </p:txBody>
+      </p:sp>
+      <p:sp>
+        <p:nvSpPr>
+          <p:cNvPr id="3" name="Date Placeholder 2"/>
+          <p:cNvSpPr>
+            <a:spLocks noGrp="1"/>
+          </p:cNvSpPr>
+          <p:nvPr>
+            <p:ph type="dt" idx="1"/>
+          </p:nvPr>
+        </p:nvSpPr>
+        <p:spPr>
+          <a:xfrm>
+            <a:off x="3884613" y="0"/>
+            <a:ext cx="2971800" cy="458788"/>
+          </a:xfrm>
+          <a:prstGeom prst="rect">
+            <a:avLst/>
+          </a:prstGeom>
+        </p:spPr>
+        <p:txBody>
+          <a:bodyPr vert="horz" lIns="91440" tIns="45720" rIns="91440" bIns="45720" rtlCol="0"/>
+          <a:lstStyle>
+            <a:lvl1pPr algn="r">
+              <a:defRPr sz="1200"/>
+            </a:lvl1pPr>
+          </a:lstStyle>
+          <a:p>
+            <a:fld id="{3895157A-C7BC-7047-9F50-18AF19308CA5}" type="datetimeFigureOut">
+              <a:rPr lang="en-US" smtClean="0"/>
+              <a:t>3/20/18</a:t>
+            </a:fld>
+            <a:endParaRPr lang="en-US"/>
+          </a:p>
+        </p:txBody>
+      </p:sp>
+      <p:sp>
+        <p:nvSpPr>
+          <p:cNvPr id="4" name="Slide Image Placeholder 3"/>
+          <p:cNvSpPr>
+            <a:spLocks noGrp="1" noRot="1" noChangeAspect="1"/>
+          </p:cNvSpPr>
+          <p:nvPr>
+            <p:ph type="sldImg" idx="2"/>
+          </p:nvPr>
+        </p:nvSpPr>
+        <p:spPr>
+          <a:xfrm>
+            <a:off x="685800" y="1143000"/>
+            <a:ext cx="5486400" cy="3086100"/>
+          </a:xfrm>
+          <a:prstGeom prst="rect">
+            <a:avLst/>
+          </a:prstGeom>
+          <a:noFill/>
+          <a:ln w="12700">
+            <a:solidFill>
+              <a:prstClr val="black"/>
+            </a:solidFill>
+          </a:ln>
+        </p:spPr>
+        <p:txBody>
+          <a:bodyPr vert="horz" lIns="91440" tIns="45720" rIns="91440" bIns="45720" rtlCol="0" anchor="ctr"/>
+          <a:lstStyle/>
+          <a:p>
+            <a:endParaRPr lang="en-US"/>
+          </a:p>
+        </p:txBody>
+      </p:sp>
+      <p:sp>
+        <p:nvSpPr>
+          <p:cNvPr id="5" name="Notes Placeholder 4"/>
+          <p:cNvSpPr>
+            <a:spLocks noGrp="1"/>
+          </p:cNvSpPr>
+          <p:nvPr>
+            <p:ph type="body" sz="quarter" idx="3"/>
+          </p:nvPr>
+        </p:nvSpPr>
+        <p:spPr>
+          <a:xfrm>
+            <a:off x="685800" y="4400550"/>
+            <a:ext cx="5486400" cy="3600450"/>
+          </a:xfrm>
+          <a:prstGeom prst="rect">
+            <a:avLst/>
+          </a:prstGeom>
+        </p:spPr>
+        <p:txBody>
+          <a:bodyPr vert="horz" lIns="91440" tIns="45720" rIns="91440" bIns="45720" rtlCol="0"/>
+          <a:lstStyle/>
+          <a:p>
+            <a:pPr lvl="0"/>
+            <a:r>
+              <a:rPr lang="en-US"/>
+              <a:t>Edit Master text styles</a:t>
+            </a:r>
+          </a:p>
+          <a:p>
+            <a:pPr lvl="1"/>
+            <a:r>
+              <a:rPr lang="en-US"/>
+              <a:t>Second level</a:t>
+            </a:r>
+          </a:p>
+          <a:p>
+            <a:pPr lvl="2"/>
+            <a:r>
+              <a:rPr lang="en-US"/>
+              <a:t>Third level</a:t>
+            </a:r>
+          </a:p>
+          <a:p>
+            <a:pPr lvl="3"/>
+            <a:r>
+              <a:rPr lang="en-US"/>
+              <a:t>Fourth level</a:t>
+            </a:r>
+          </a:p>
+          <a:p>
+            <a:pPr lvl="4"/>
+            <a:r>
+              <a:rPr lang="en-US"/>
+              <a:t>Fifth level</a:t>
+            </a:r>
+          </a:p>
+        </p:txBody>
+      </p:sp>
+      <p:sp>
+        <p:nvSpPr>
+          <p:cNvPr id="6" name="Footer Placeholder 5"/>
+          <p:cNvSpPr>
+            <a:spLocks noGrp="1"/>
+          </p:cNvSpPr>
+          <p:nvPr>
+            <p:ph type="ftr" sz="quarter" idx="4"/>
+          </p:nvPr>
+        </p:nvSpPr>
+        <p:spPr>
+          <a:xfrm>
+            <a:off x="0" y="8685213"/>
+            <a:ext cx="2971800" cy="458787"/>
+          </a:xfrm>
+          <a:prstGeom prst="rect">
+            <a:avLst/>
+          </a:prstGeom>
+        </p:spPr>
+        <p:txBody>
+          <a:bodyPr vert="horz" lIns="91440" tIns="45720" rIns="91440" bIns="45720" rtlCol="0" anchor="b"/>
+          <a:lstStyle>
+            <a:lvl1pPr algn="l">
+              <a:defRPr sz="1200"/>
+            </a:lvl1pPr>
+          </a:lstStyle>
+          <a:p>
+            <a:endParaRPr lang="en-US"/>
+          </a:p>
+        </p:txBody>
+      </p:sp>
+      <p:sp>
+        <p:nvSpPr>
+          <p:cNvPr id="7" name="Slide Number Placeholder 6"/>
+          <p:cNvSpPr>
+            <a:spLocks noGrp="1"/>
+          </p:cNvSpPr>
+          <p:nvPr>
+            <p:ph type="sldNum" sz="quarter" idx="5"/>
+          </p:nvPr>
+        </p:nvSpPr>
+        <p:spPr>
+          <a:xfrm>
+            <a:off x="3884613" y="8685213"/>
+            <a:ext cx="2971800" cy="458787"/>
+          </a:xfrm>
+          <a:prstGeom prst="rect">
+            <a:avLst/>
+          </a:prstGeom>
+        </p:spPr>
+        <p:txBody>
+          <a:bodyPr vert="horz" lIns="91440" tIns="45720" rIns="91440" bIns="45720" rtlCol="0" anchor="b"/>
+          <a:lstStyle>
+            <a:lvl1pPr algn="r">
+              <a:defRPr sz="1200"/>
+            </a:lvl1pPr>
+          </a:lstStyle>
+          <a:p>
+            <a:fld id="{3A0588BF-BDD4-204F-A8C9-1E100C1BAC61}" type="slidenum">
+              <a:rPr lang="en-US" smtClean="0"/>
+              <a:t>‹#›</a:t>
+            </a:fld>
+            <a:endParaRPr lang="en-US"/>
+          </a:p>
+        </p:txBody>
+      </p:sp>
+    </p:spTree>
+    <p:extLst>
+      <p:ext uri="{BB962C8B-B14F-4D97-AF65-F5344CB8AC3E}">
+        <p14:creationId xmlns:p14="http://schemas.microsoft.com/office/powerpoint/2010/main" val="1763104913"/>
+      </p:ext>
+    </p:extLst>
+  </p:cSld>
+  <p:clrMap bg1="lt1" tx1="dk1" bg2="lt2" tx2="dk2" accent1="accent1" accent2="accent2" accent3="accent3" accent4="accent4" accent5="accent5" accent6="accent6" hlink="hlink" folHlink="folHlink"/>
+  <p:notesStyle>
+    <a:lvl1pPr marL="0" algn="l" defTabSz="914400" rtl="0" eaLnBrk="1" latinLnBrk="0" hangingPunct="1">
+      <a:defRPr sz="1200" kern="1200">
+        <a:solidFill>
+          <a:schemeClr val="tx1"/>
+        </a:solidFill>
+        <a:latin typeface="+mn-lt"/>
+        <a:ea typeface="+mn-ea"/>
+        <a:cs typeface="+mn-cs"/>
+      </a:defRPr>
+    </a:lvl1pPr>
+    <a:lvl2pPr marL="457200" algn="l" defTabSz="914400" rtl="0" eaLnBrk="1" latinLnBrk="0" hangingPunct="1">
+      <a:defRPr sz="1200" kern="1200">
+        <a:solidFill>
+          <a:schemeClr val="tx1"/>
+        </a:solidFill>
+        <a:latin typeface="+mn-lt"/>
+        <a:ea typeface="+mn-ea"/>
+        <a:cs typeface="+mn-cs"/>
+      </a:defRPr>
+    </a:lvl2pPr>
+    <a:lvl3pPr marL="914400" algn="l" defTabSz="914400" rtl="0" eaLnBrk="1" latinLnBrk="0" hangingPunct="1">
+      <a:defRPr sz="1200" kern="1200">
+        <a:solidFill>
+          <a:schemeClr val="tx1"/>
+        </a:solidFill>
+        <a:latin typeface="+mn-lt"/>
+        <a:ea typeface="+mn-ea"/>
+        <a:cs typeface="+mn-cs"/>
+      </a:defRPr>
+    </a:lvl3pPr>
+    <a:lvl4pPr marL="1371600" algn="l" defTabSz="914400" rtl="0" eaLnBrk="1" latinLnBrk="0" hangingPunct="1">
+      <a:defRPr sz="1200" kern="1200">
+        <a:solidFill>
+          <a:schemeClr val="tx1"/>
+        </a:solidFill>
+        <a:latin typeface="+mn-lt"/>
+        <a:ea typeface="+mn-ea"/>
+        <a:cs typeface="+mn-cs"/>
+      </a:defRPr>
+    </a:lvl4pPr>
+    <a:lvl5pPr marL="1828800" algn="l" defTabSz="914400" rtl="0" eaLnBrk="1" latinLnBrk="0" hangingPunct="1">
+      <a:defRPr sz="1200" kern="1200">
+        <a:solidFill>
+          <a:schemeClr val="tx1"/>
+        </a:solidFill>
+        <a:latin typeface="+mn-lt"/>
+        <a:ea typeface="+mn-ea"/>
+        <a:cs typeface="+mn-cs"/>
+      </a:defRPr>
+    </a:lvl5pPr>
+    <a:lvl6pPr marL="2286000" algn="l" defTabSz="914400" rtl="0" eaLnBrk="1" latinLnBrk="0" hangingPunct="1">
+      <a:defRPr sz="1200" kern="1200">
+        <a:solidFill>
+          <a:schemeClr val="tx1"/>
+        </a:solidFill>
+        <a:latin typeface="+mn-lt"/>
+        <a:ea typeface="+mn-ea"/>
+        <a:cs typeface="+mn-cs"/>
+      </a:defRPr>
+    </a:lvl6pPr>
+    <a:lvl7pPr marL="2743200" algn="l" defTabSz="914400" rtl="0" eaLnBrk="1" latinLnBrk="0" hangingPunct="1">
+      <a:defRPr sz="1200" kern="1200">
+        <a:solidFill>
+          <a:schemeClr val="tx1"/>
+        </a:solidFill>
+        <a:latin typeface="+mn-lt"/>
+        <a:ea typeface="+mn-ea"/>
+        <a:cs typeface="+mn-cs"/>
+      </a:defRPr>
+    </a:lvl7pPr>
+    <a:lvl8pPr marL="3200400" algn="l" defTabSz="914400" rtl="0" eaLnBrk="1" latinLnBrk="0" hangingPunct="1">
+      <a:defRPr sz="1200" kern="1200">
+        <a:solidFill>
+          <a:schemeClr val="tx1"/>
+        </a:solidFill>
+        <a:latin typeface="+mn-lt"/>
+        <a:ea typeface="+mn-ea"/>
+        <a:cs typeface="+mn-cs"/>
+      </a:defRPr>
+    </a:lvl8pPr>
+    <a:lvl9pPr marL="3657600" algn="l" defTabSz="914400" rtl="0" eaLnBrk="1" latinLnBrk="0" hangingPunct="1">
+      <a:defRPr sz="1200" kern="1200">
+        <a:solidFill>
+          <a:schemeClr val="tx1"/>
+        </a:solidFill>
+        <a:latin typeface="+mn-lt"/>
+        <a:ea typeface="+mn-ea"/>
+        <a:cs typeface="+mn-cs"/>
+      </a:defRPr>
+    </a:lvl9pPr>
+  </p:notesStyle>
+</p:notesMaster>
 </file>
 
 <file path=ppt/slideLayouts/slideLayout1.xml><?xml version="1.0" encoding="utf-8"?>
@@ -347,10 +699,9 @@
           <a:bodyPr/>
           <a:lstStyle/>
           <a:p>
-            <a:fld id="{B61BEF0D-F0BB-DE4B-95CE-6DB70DBA9567}" type="datetimeFigureOut">
-              <a:rPr lang="en-US" dirty="0"/>
-              <a:pPr/>
-              <a:t>2/4/2018</a:t>
+            <a:fld id="{263F22C6-7BF4-A34C-B102-621E21A66F98}" type="datetime1">
+              <a:rPr lang="en-US" smtClean="0"/>
+              <a:t>3/20/18</a:t>
             </a:fld>
             <a:endParaRPr lang="en-US" dirty="0"/>
           </a:p>
@@ -676,10 +1027,9 @@
           <a:bodyPr/>
           <a:lstStyle/>
           <a:p>
-            <a:fld id="{B61BEF0D-F0BB-DE4B-95CE-6DB70DBA9567}" type="datetimeFigureOut">
-              <a:rPr lang="en-US" dirty="0"/>
-              <a:pPr/>
-              <a:t>2/4/2018</a:t>
+            <a:fld id="{6D5E54D8-501C-894C-905F-F8D88D574B55}" type="datetime1">
+              <a:rPr lang="en-US" smtClean="0"/>
+              <a:t>3/20/18</a:t>
             </a:fld>
             <a:endParaRPr lang="en-US" dirty="0"/>
           </a:p>
@@ -921,10 +1271,9 @@
           <a:bodyPr/>
           <a:lstStyle/>
           <a:p>
-            <a:fld id="{B61BEF0D-F0BB-DE4B-95CE-6DB70DBA9567}" type="datetimeFigureOut">
-              <a:rPr lang="en-US" dirty="0"/>
-              <a:pPr/>
-              <a:t>2/4/2018</a:t>
+            <a:fld id="{D303330D-2505-354D-822F-5E58CCCF79AA}" type="datetime1">
+              <a:rPr lang="en-US" smtClean="0"/>
+              <a:t>3/20/18</a:t>
             </a:fld>
             <a:endParaRPr lang="en-US" dirty="0"/>
           </a:p>
@@ -1264,10 +1613,9 @@
           <a:bodyPr/>
           <a:lstStyle/>
           <a:p>
-            <a:fld id="{B61BEF0D-F0BB-DE4B-95CE-6DB70DBA9567}" type="datetimeFigureOut">
-              <a:rPr lang="en-US" dirty="0"/>
-              <a:pPr/>
-              <a:t>2/4/2018</a:t>
+            <a:fld id="{073848E0-047E-0A49-83ED-C0E4B10385F1}" type="datetime1">
+              <a:rPr lang="en-US" smtClean="0"/>
+              <a:t>3/20/18</a:t>
             </a:fld>
             <a:endParaRPr lang="en-US" dirty="0"/>
           </a:p>
@@ -1615,10 +1963,9 @@
           <a:bodyPr/>
           <a:lstStyle/>
           <a:p>
-            <a:fld id="{B61BEF0D-F0BB-DE4B-95CE-6DB70DBA9567}" type="datetimeFigureOut">
-              <a:rPr lang="en-US" dirty="0"/>
-              <a:pPr/>
-              <a:t>2/4/2018</a:t>
+            <a:fld id="{E19833D2-DA89-C848-926E-27E1467E96D0}" type="datetime1">
+              <a:rPr lang="en-US" smtClean="0"/>
+              <a:t>3/20/18</a:t>
             </a:fld>
             <a:endParaRPr lang="en-US" dirty="0"/>
           </a:p>
@@ -1986,10 +2333,9 @@
           <a:bodyPr/>
           <a:lstStyle/>
           <a:p>
-            <a:fld id="{B61BEF0D-F0BB-DE4B-95CE-6DB70DBA9567}" type="datetimeFigureOut">
-              <a:rPr lang="en-US" dirty="0"/>
-              <a:pPr/>
-              <a:t>2/4/2018</a:t>
+            <a:fld id="{FEFDA3D9-5089-6B4C-B4B4-1550262178C1}" type="datetime1">
+              <a:rPr lang="en-US" smtClean="0"/>
+              <a:t>3/20/18</a:t>
             </a:fld>
             <a:endParaRPr lang="en-US" dirty="0"/>
           </a:p>
@@ -2460,10 +2806,9 @@
           <a:bodyPr/>
           <a:lstStyle/>
           <a:p>
-            <a:fld id="{B61BEF0D-F0BB-DE4B-95CE-6DB70DBA9567}" type="datetimeFigureOut">
-              <a:rPr lang="en-US" dirty="0"/>
-              <a:pPr/>
-              <a:t>2/4/2018</a:t>
+            <a:fld id="{863FE5E5-01F3-454D-AFA9-1FF5584F5BF1}" type="datetime1">
+              <a:rPr lang="en-US" smtClean="0"/>
+              <a:t>3/20/18</a:t>
             </a:fld>
             <a:endParaRPr lang="en-US" dirty="0"/>
           </a:p>
@@ -2669,10 +3014,9 @@
           <a:bodyPr/>
           <a:lstStyle/>
           <a:p>
-            <a:fld id="{B61BEF0D-F0BB-DE4B-95CE-6DB70DBA9567}" type="datetimeFigureOut">
-              <a:rPr lang="en-US" dirty="0"/>
-              <a:pPr/>
-              <a:t>2/4/2018</a:t>
+            <a:fld id="{4D079F0F-90F9-694E-8308-EE6B1EAE177E}" type="datetime1">
+              <a:rPr lang="en-US" smtClean="0"/>
+              <a:t>3/20/18</a:t>
             </a:fld>
             <a:endParaRPr lang="en-US" dirty="0"/>
           </a:p>
@@ -2884,10 +3228,9 @@
           <a:bodyPr/>
           <a:lstStyle/>
           <a:p>
-            <a:fld id="{B61BEF0D-F0BB-DE4B-95CE-6DB70DBA9567}" type="datetimeFigureOut">
-              <a:rPr lang="en-US" dirty="0"/>
-              <a:pPr/>
-              <a:t>2/4/2018</a:t>
+            <a:fld id="{44AE7D02-6AB7-BD42-A29A-1A08C239FE95}" type="datetime1">
+              <a:rPr lang="en-US" smtClean="0"/>
+              <a:t>3/20/18</a:t>
             </a:fld>
             <a:endParaRPr lang="en-US" dirty="0"/>
           </a:p>
@@ -3127,9 +3470,9 @@
           <a:bodyPr/>
           <a:lstStyle/>
           <a:p>
-            <a:fld id="{05BFA754-D5C3-4E66-96A6-867B257F58DC}" type="datetimeFigureOut">
-              <a:rPr lang="en-US" dirty="0"/>
-              <a:t>2/4/2018</a:t>
+            <a:fld id="{7664C442-481A-B945-8214-5CA7F4878B56}" type="datetime1">
+              <a:rPr lang="en-US" smtClean="0"/>
+              <a:t>3/20/18</a:t>
             </a:fld>
             <a:endParaRPr lang="en-US" dirty="0"/>
           </a:p>
@@ -3370,10 +3713,9 @@
           <a:bodyPr/>
           <a:lstStyle/>
           <a:p>
-            <a:fld id="{B61BEF0D-F0BB-DE4B-95CE-6DB70DBA9567}" type="datetimeFigureOut">
-              <a:rPr lang="en-US" dirty="0"/>
-              <a:pPr/>
-              <a:t>2/4/2018</a:t>
+            <a:fld id="{E63E2016-3487-0A4C-B87D-BC72E6B3C32C}" type="datetime1">
+              <a:rPr lang="en-US" smtClean="0"/>
+              <a:t>3/20/18</a:t>
             </a:fld>
             <a:endParaRPr lang="en-US" dirty="0"/>
           </a:p>
@@ -3679,9 +4021,9 @@
           <a:bodyPr/>
           <a:lstStyle/>
           <a:p>
-            <a:fld id="{05BFA754-D5C3-4E66-96A6-867B257F58DC}" type="datetimeFigureOut">
-              <a:rPr lang="en-US" dirty="0"/>
-              <a:t>2/4/2018</a:t>
+            <a:fld id="{943680A4-4442-4C42-9659-FC18633E7A27}" type="datetime1">
+              <a:rPr lang="en-US" smtClean="0"/>
+              <a:t>3/20/18</a:t>
             </a:fld>
             <a:endParaRPr lang="en-US" dirty="0"/>
           </a:p>
@@ -4056,10 +4398,9 @@
           <a:bodyPr/>
           <a:lstStyle/>
           <a:p>
-            <a:fld id="{B61BEF0D-F0BB-DE4B-95CE-6DB70DBA9567}" type="datetimeFigureOut">
-              <a:rPr lang="en-US" dirty="0"/>
-              <a:pPr/>
-              <a:t>2/4/2018</a:t>
+            <a:fld id="{684DAF1D-66D9-BC48-B5CB-4512351FE6B3}" type="datetime1">
+              <a:rPr lang="en-US" smtClean="0"/>
+              <a:t>3/20/18</a:t>
             </a:fld>
             <a:endParaRPr lang="en-US" dirty="0"/>
           </a:p>
@@ -4209,10 +4550,9 @@
           <a:bodyPr/>
           <a:lstStyle/>
           <a:p>
-            <a:fld id="{B61BEF0D-F0BB-DE4B-95CE-6DB70DBA9567}" type="datetimeFigureOut">
-              <a:rPr lang="en-US" dirty="0"/>
-              <a:pPr/>
-              <a:t>2/4/2018</a:t>
+            <a:fld id="{B3EFA0CF-E1F6-8842-BCD6-62AD742803F4}" type="datetime1">
+              <a:rPr lang="en-US" smtClean="0"/>
+              <a:t>3/20/18</a:t>
             </a:fld>
             <a:endParaRPr lang="en-US" dirty="0"/>
           </a:p>
@@ -4339,10 +4679,9 @@
           <a:bodyPr/>
           <a:lstStyle/>
           <a:p>
-            <a:fld id="{B61BEF0D-F0BB-DE4B-95CE-6DB70DBA9567}" type="datetimeFigureOut">
-              <a:rPr lang="en-US" dirty="0"/>
-              <a:pPr/>
-              <a:t>2/4/2018</a:t>
+            <a:fld id="{32F2AC1E-1687-0743-863B-51A73E284E6E}" type="datetime1">
+              <a:rPr lang="en-US" smtClean="0"/>
+              <a:t>3/20/18</a:t>
             </a:fld>
             <a:endParaRPr lang="en-US" dirty="0"/>
           </a:p>
@@ -4591,10 +4930,9 @@
           <a:bodyPr/>
           <a:lstStyle/>
           <a:p>
-            <a:fld id="{B61BEF0D-F0BB-DE4B-95CE-6DB70DBA9567}" type="datetimeFigureOut">
-              <a:rPr lang="en-US" dirty="0"/>
-              <a:pPr/>
-              <a:t>2/4/2018</a:t>
+            <a:fld id="{ECF99E42-632D-5545-AC9A-DAA45D55E034}" type="datetime1">
+              <a:rPr lang="en-US" smtClean="0"/>
+              <a:t>3/20/18</a:t>
             </a:fld>
             <a:endParaRPr lang="en-US" dirty="0"/>
           </a:p>
@@ -4910,10 +5248,9 @@
           <a:bodyPr/>
           <a:lstStyle/>
           <a:p>
-            <a:fld id="{B61BEF0D-F0BB-DE4B-95CE-6DB70DBA9567}" type="datetimeFigureOut">
-              <a:rPr lang="en-US" dirty="0"/>
-              <a:pPr/>
-              <a:t>2/4/2018</a:t>
+            <a:fld id="{EA01BCED-5119-A942-AF24-956AF8A69E83}" type="datetime1">
+              <a:rPr lang="en-US" smtClean="0"/>
+              <a:t>3/20/18</a:t>
             </a:fld>
             <a:endParaRPr lang="en-US" dirty="0"/>
           </a:p>
@@ -5151,10 +5488,9 @@
             </a:lvl1pPr>
           </a:lstStyle>
           <a:p>
-            <a:fld id="{B61BEF0D-F0BB-DE4B-95CE-6DB70DBA9567}" type="datetimeFigureOut">
-              <a:rPr lang="en-US" dirty="0"/>
-              <a:pPr/>
-              <a:t>2/4/2018</a:t>
+            <a:fld id="{BB2F7036-05F7-4F47-8435-2234FE77FFB6}" type="datetime1">
+              <a:rPr lang="en-US" smtClean="0"/>
+              <a:t>3/20/18</a:t>
             </a:fld>
             <a:endParaRPr lang="en-US" dirty="0"/>
           </a:p>
@@ -5220,7 +5556,7 @@
           <a:bodyPr vert="horz" lIns="91440" tIns="45720" rIns="91440" bIns="45720" rtlCol="0" anchor="ctr"/>
           <a:lstStyle>
             <a:lvl1pPr algn="r">
-              <a:defRPr sz="1000" b="0" i="0">
+              <a:defRPr sz="1400" b="0" i="0">
                 <a:solidFill>
                   <a:schemeClr val="tx1"/>
                 </a:solidFill>
@@ -5230,8 +5566,8 @@
             </a:lvl1pPr>
           </a:lstStyle>
           <a:p>
-            <a:fld id="{D57F1E4F-1CFF-5643-939E-217C01CDF565}" type="slidenum">
-              <a:rPr lang="en-US" dirty="0"/>
+            <a:fld id="{742665D8-1852-3542-83FF-8901962F6EFD}" type="slidenum">
+              <a:rPr lang="en-US" smtClean="0"/>
               <a:pPr/>
               <a:t>‹#›</a:t>
             </a:fld>
@@ -5261,6 +5597,7 @@
     <p:sldLayoutId id="2147483658" r:id="rId16"/>
     <p:sldLayoutId id="2147483659" r:id="rId17"/>
   </p:sldLayoutIdLst>
+  <p:hf hdr="0" ftr="0" dt="0"/>
   <p:txStyles>
     <p:titleStyle>
       <a:lvl1pPr algn="ctr" defTabSz="457200" rtl="0" eaLnBrk="1" latinLnBrk="0" hangingPunct="1">
@@ -5790,6 +6127,995 @@
           <p:cNvPr id="2" name="Title 1">
             <a:extLst>
               <a:ext uri="{FF2B5EF4-FFF2-40B4-BE49-F238E27FC236}">
+                <a16:creationId xmlns:a16="http://schemas.microsoft.com/office/drawing/2014/main" id="{686DA4E1-048E-C845-B65A-855B495566C2}"/>
+              </a:ext>
+            </a:extLst>
+          </p:cNvPr>
+          <p:cNvSpPr>
+            <a:spLocks noGrp="1"/>
+          </p:cNvSpPr>
+          <p:nvPr>
+            <p:ph type="title"/>
+          </p:nvPr>
+        </p:nvSpPr>
+        <p:spPr/>
+        <p:txBody>
+          <a:bodyPr/>
+          <a:lstStyle/>
+          <a:p>
+            <a:r>
+              <a:rPr lang="en-US" dirty="0"/>
+              <a:t>First Webpage: Navigation</a:t>
+            </a:r>
+          </a:p>
+        </p:txBody>
+      </p:sp>
+      <p:sp>
+        <p:nvSpPr>
+          <p:cNvPr id="3" name="Content Placeholder 2">
+            <a:extLst>
+              <a:ext uri="{FF2B5EF4-FFF2-40B4-BE49-F238E27FC236}">
+                <a16:creationId xmlns:a16="http://schemas.microsoft.com/office/drawing/2014/main" id="{B5733112-70FA-0A43-B9BA-C0C69EABFE79}"/>
+              </a:ext>
+            </a:extLst>
+          </p:cNvPr>
+          <p:cNvSpPr>
+            <a:spLocks noGrp="1"/>
+          </p:cNvSpPr>
+          <p:nvPr>
+            <p:ph idx="1"/>
+          </p:nvPr>
+        </p:nvSpPr>
+        <p:spPr/>
+        <p:txBody>
+          <a:bodyPr>
+            <a:normAutofit fontScale="92500"/>
+          </a:bodyPr>
+          <a:lstStyle/>
+          <a:p>
+            <a:pPr marL="457200" indent="-457200">
+              <a:buFont typeface="+mj-lt"/>
+              <a:buAutoNum type="arabicPeriod"/>
+            </a:pPr>
+            <a:r>
+              <a:rPr lang="en-US" dirty="0"/>
+              <a:t>Locate the </a:t>
+            </a:r>
+            <a:r>
+              <a:rPr lang="en-US" dirty="0">
+                <a:latin typeface="Courier" pitchFamily="2" charset="0"/>
+              </a:rPr>
+              <a:t>&lt;</a:t>
+            </a:r>
+            <a:r>
+              <a:rPr lang="en-US" dirty="0" err="1">
+                <a:latin typeface="Courier" pitchFamily="2" charset="0"/>
+              </a:rPr>
+              <a:t>nav</a:t>
+            </a:r>
+            <a:r>
+              <a:rPr lang="en-US" dirty="0">
+                <a:latin typeface="Courier" pitchFamily="2" charset="0"/>
+              </a:rPr>
+              <a:t>&gt;&lt;/</a:t>
+            </a:r>
+            <a:r>
+              <a:rPr lang="en-US" dirty="0" err="1">
+                <a:latin typeface="Courier" pitchFamily="2" charset="0"/>
+              </a:rPr>
+              <a:t>nav</a:t>
+            </a:r>
+            <a:r>
+              <a:rPr lang="en-US" dirty="0">
+                <a:latin typeface="Courier" pitchFamily="2" charset="0"/>
+              </a:rPr>
+              <a:t>&gt; </a:t>
+            </a:r>
+            <a:r>
+              <a:rPr lang="en-US" dirty="0"/>
+              <a:t>section under </a:t>
+            </a:r>
+            <a:r>
+              <a:rPr lang="en-US" dirty="0">
+                <a:latin typeface="Courier" pitchFamily="2" charset="0"/>
+              </a:rPr>
+              <a:t>&lt;body&gt;</a:t>
+            </a:r>
+          </a:p>
+          <a:p>
+            <a:pPr marL="457200" indent="-457200">
+              <a:buFont typeface="+mj-lt"/>
+              <a:buAutoNum type="arabicPeriod"/>
+            </a:pPr>
+            <a:r>
+              <a:rPr lang="en-US" dirty="0"/>
+              <a:t>Add a link to the </a:t>
+            </a:r>
+            <a:r>
+              <a:rPr lang="en-US" dirty="0" err="1">
+                <a:latin typeface="Courier" pitchFamily="2" charset="0"/>
+              </a:rPr>
+              <a:t>nav</a:t>
+            </a:r>
+            <a:r>
+              <a:rPr lang="en-US" dirty="0"/>
+              <a:t> section for </a:t>
+            </a:r>
+            <a:r>
+              <a:rPr lang="en-US" dirty="0" err="1"/>
+              <a:t>xckd</a:t>
+            </a:r>
+            <a:endParaRPr lang="en-US" dirty="0"/>
+          </a:p>
+          <a:p>
+            <a:pPr lvl="1"/>
+            <a:r>
+              <a:rPr lang="en-US" sz="2400" dirty="0">
+                <a:latin typeface="Courier" pitchFamily="2" charset="0"/>
+              </a:rPr>
+              <a:t>&lt;a </a:t>
+            </a:r>
+            <a:r>
+              <a:rPr lang="en-US" sz="2400" dirty="0" err="1">
+                <a:latin typeface="Courier" pitchFamily="2" charset="0"/>
+              </a:rPr>
+              <a:t>href</a:t>
+            </a:r>
+            <a:r>
+              <a:rPr lang="en-US" sz="2400" dirty="0">
+                <a:latin typeface="Courier" pitchFamily="2" charset="0"/>
+              </a:rPr>
+              <a:t>=“https://</a:t>
+            </a:r>
+            <a:r>
+              <a:rPr lang="en-US" sz="2400" dirty="0" err="1">
+                <a:latin typeface="Courier" pitchFamily="2" charset="0"/>
+              </a:rPr>
+              <a:t>xkcd.com</a:t>
+            </a:r>
+            <a:r>
+              <a:rPr lang="en-US" sz="2400" dirty="0">
+                <a:latin typeface="Courier" pitchFamily="2" charset="0"/>
+              </a:rPr>
+              <a:t>”&gt;External Link&lt;/a&gt;</a:t>
+            </a:r>
+          </a:p>
+          <a:p>
+            <a:pPr marL="457200" indent="-457200">
+              <a:buFont typeface="+mj-lt"/>
+              <a:buAutoNum type="arabicPeriod"/>
+            </a:pPr>
+            <a:r>
+              <a:rPr lang="en-US" dirty="0"/>
+              <a:t>Add a link to the </a:t>
+            </a:r>
+            <a:r>
+              <a:rPr lang="en-US" dirty="0" err="1">
+                <a:latin typeface="Courier" pitchFamily="2" charset="0"/>
+              </a:rPr>
+              <a:t>nav</a:t>
+            </a:r>
+            <a:r>
+              <a:rPr lang="en-US" dirty="0"/>
+              <a:t> section for </a:t>
+            </a:r>
+          </a:p>
+          <a:p>
+            <a:pPr lvl="1"/>
+            <a:r>
+              <a:rPr lang="en-US" dirty="0">
+                <a:latin typeface="Courier" pitchFamily="2" charset="0"/>
+              </a:rPr>
+              <a:t>&lt;a </a:t>
+            </a:r>
+            <a:r>
+              <a:rPr lang="en-US" dirty="0" err="1">
+                <a:latin typeface="Courier" pitchFamily="2" charset="0"/>
+              </a:rPr>
+              <a:t>href</a:t>
+            </a:r>
+            <a:r>
+              <a:rPr lang="en-US" dirty="0">
+                <a:latin typeface="Courier" pitchFamily="2" charset="0"/>
+              </a:rPr>
+              <a:t>=“media/</a:t>
+            </a:r>
+            <a:r>
+              <a:rPr lang="en-US" dirty="0" err="1">
+                <a:latin typeface="Courier" pitchFamily="2" charset="0"/>
+              </a:rPr>
+              <a:t>answer_to_life.txt</a:t>
+            </a:r>
+            <a:r>
+              <a:rPr lang="en-US" dirty="0">
+                <a:latin typeface="Courier" pitchFamily="2" charset="0"/>
+              </a:rPr>
+              <a:t>”&gt;Local Link&lt;/a&gt;</a:t>
+            </a:r>
+            <a:endParaRPr lang="en-US" dirty="0"/>
+          </a:p>
+          <a:p>
+            <a:pPr marL="457200" indent="-457200">
+              <a:buFont typeface="+mj-lt"/>
+              <a:buAutoNum type="arabicPeriod"/>
+            </a:pPr>
+            <a:r>
+              <a:rPr lang="en-US" dirty="0"/>
+              <a:t>Copy the </a:t>
+            </a:r>
+            <a:r>
+              <a:rPr lang="en-US" dirty="0" err="1"/>
+              <a:t>xckd</a:t>
+            </a:r>
+            <a:r>
+              <a:rPr lang="en-US" dirty="0"/>
+              <a:t> link and set it to open in a new tab</a:t>
+            </a:r>
+          </a:p>
+          <a:p>
+            <a:pPr lvl="1"/>
+            <a:r>
+              <a:rPr lang="en-US" dirty="0">
+                <a:latin typeface="Courier" pitchFamily="2" charset="0"/>
+              </a:rPr>
+              <a:t>&lt;a </a:t>
+            </a:r>
+            <a:r>
+              <a:rPr lang="en-US" dirty="0" err="1">
+                <a:latin typeface="Courier" pitchFamily="2" charset="0"/>
+              </a:rPr>
+              <a:t>href</a:t>
+            </a:r>
+            <a:r>
+              <a:rPr lang="en-US" dirty="0">
+                <a:latin typeface="Courier" pitchFamily="2" charset="0"/>
+              </a:rPr>
+              <a:t>=“https://xkcd.com” target=“_blank”&gt;New Tab Link&lt;/a&gt;</a:t>
+            </a:r>
+            <a:endParaRPr lang="en-US" dirty="0"/>
+          </a:p>
+        </p:txBody>
+      </p:sp>
+      <p:sp>
+        <p:nvSpPr>
+          <p:cNvPr id="4" name="Slide Number Placeholder 3">
+            <a:extLst>
+              <a:ext uri="{FF2B5EF4-FFF2-40B4-BE49-F238E27FC236}">
+                <a16:creationId xmlns:a16="http://schemas.microsoft.com/office/drawing/2014/main" id="{326F40D1-649E-2F4B-8B8C-B386B7040E4D}"/>
+              </a:ext>
+            </a:extLst>
+          </p:cNvPr>
+          <p:cNvSpPr>
+            <a:spLocks noGrp="1"/>
+          </p:cNvSpPr>
+          <p:nvPr>
+            <p:ph type="sldNum" sz="quarter" idx="12"/>
+          </p:nvPr>
+        </p:nvSpPr>
+        <p:spPr/>
+        <p:txBody>
+          <a:bodyPr/>
+          <a:lstStyle/>
+          <a:p>
+            <a:fld id="{5D84065D-F351-4B03-BD91-D8A6B8D4B362}" type="slidenum">
+              <a:rPr lang="en-US" smtClean="0"/>
+              <a:t>10</a:t>
+            </a:fld>
+            <a:endParaRPr lang="en-US" dirty="0"/>
+          </a:p>
+        </p:txBody>
+      </p:sp>
+    </p:spTree>
+    <p:extLst>
+      <p:ext uri="{BB962C8B-B14F-4D97-AF65-F5344CB8AC3E}">
+        <p14:creationId xmlns:p14="http://schemas.microsoft.com/office/powerpoint/2010/main" val="2703737613"/>
+      </p:ext>
+    </p:extLst>
+  </p:cSld>
+  <p:clrMapOvr>
+    <a:masterClrMapping/>
+  </p:clrMapOvr>
+</p:sld>
+</file>
+
+<file path=ppt/slides/slide11.xml><?xml version="1.0" encoding="utf-8"?>
+<p:sld xmlns:a="http://schemas.openxmlformats.org/drawingml/2006/main" xmlns:r="http://schemas.openxmlformats.org/officeDocument/2006/relationships" xmlns:p="http://schemas.openxmlformats.org/presentationml/2006/main">
+  <p:cSld>
+    <p:spTree>
+      <p:nvGrpSpPr>
+        <p:cNvPr id="1" name=""/>
+        <p:cNvGrpSpPr/>
+        <p:nvPr/>
+      </p:nvGrpSpPr>
+      <p:grpSpPr>
+        <a:xfrm>
+          <a:off x="0" y="0"/>
+          <a:ext cx="0" cy="0"/>
+          <a:chOff x="0" y="0"/>
+          <a:chExt cx="0" cy="0"/>
+        </a:xfrm>
+      </p:grpSpPr>
+      <p:sp>
+        <p:nvSpPr>
+          <p:cNvPr id="2" name="Title 1">
+            <a:extLst>
+              <a:ext uri="{FF2B5EF4-FFF2-40B4-BE49-F238E27FC236}">
+                <a16:creationId xmlns:a16="http://schemas.microsoft.com/office/drawing/2014/main" id="{7AE8A763-8EFC-41BE-A306-604D03EBF5C2}"/>
+              </a:ext>
+            </a:extLst>
+          </p:cNvPr>
+          <p:cNvSpPr>
+            <a:spLocks noGrp="1"/>
+          </p:cNvSpPr>
+          <p:nvPr>
+            <p:ph type="title"/>
+          </p:nvPr>
+        </p:nvSpPr>
+        <p:spPr/>
+        <p:txBody>
+          <a:bodyPr/>
+          <a:lstStyle/>
+          <a:p>
+            <a:r>
+              <a:rPr lang="en-US" dirty="0"/>
+              <a:t>Beautification: Attempt 1</a:t>
+            </a:r>
+          </a:p>
+        </p:txBody>
+      </p:sp>
+      <p:sp>
+        <p:nvSpPr>
+          <p:cNvPr id="3" name="Content Placeholder 2">
+            <a:extLst>
+              <a:ext uri="{FF2B5EF4-FFF2-40B4-BE49-F238E27FC236}">
+                <a16:creationId xmlns:a16="http://schemas.microsoft.com/office/drawing/2014/main" id="{9B65B205-A428-44DD-86C4-F9CBBB3B1506}"/>
+              </a:ext>
+            </a:extLst>
+          </p:cNvPr>
+          <p:cNvSpPr>
+            <a:spLocks noGrp="1"/>
+          </p:cNvSpPr>
+          <p:nvPr>
+            <p:ph idx="1"/>
+          </p:nvPr>
+        </p:nvSpPr>
+        <p:spPr/>
+        <p:txBody>
+          <a:bodyPr/>
+          <a:lstStyle/>
+          <a:p>
+            <a:pPr marL="457200" indent="-457200">
+              <a:buFont typeface="+mj-lt"/>
+              <a:buAutoNum type="arabicPeriod"/>
+            </a:pPr>
+            <a:r>
+              <a:rPr lang="en-US" dirty="0"/>
+              <a:t>Create a file called </a:t>
+            </a:r>
+            <a:r>
+              <a:rPr lang="en-US" dirty="0">
+                <a:latin typeface="Courier New" panose="02070309020205020404" pitchFamily="49" charset="0"/>
+                <a:cs typeface="Courier New" panose="02070309020205020404" pitchFamily="49" charset="0"/>
+              </a:rPr>
+              <a:t>styles.css</a:t>
+            </a:r>
+          </a:p>
+          <a:p>
+            <a:pPr marL="457200" indent="-457200">
+              <a:buFont typeface="+mj-lt"/>
+              <a:buAutoNum type="arabicPeriod"/>
+            </a:pPr>
+            <a:r>
+              <a:rPr lang="en-US" dirty="0">
+                <a:cs typeface="Courier New" panose="02070309020205020404" pitchFamily="49" charset="0"/>
+              </a:rPr>
+              <a:t>Link the file to </a:t>
+            </a:r>
+            <a:r>
+              <a:rPr lang="en-US" dirty="0">
+                <a:latin typeface="Courier New" panose="02070309020205020404" pitchFamily="49" charset="0"/>
+                <a:cs typeface="Courier New" panose="02070309020205020404" pitchFamily="49" charset="0"/>
+              </a:rPr>
+              <a:t>index.html </a:t>
+            </a:r>
+            <a:r>
+              <a:rPr lang="en-US" dirty="0">
+                <a:cs typeface="Courier New" panose="02070309020205020404" pitchFamily="49" charset="0"/>
+              </a:rPr>
+              <a:t>in </a:t>
+            </a:r>
+            <a:r>
+              <a:rPr lang="en-US" dirty="0">
+                <a:latin typeface="Courier New" panose="02070309020205020404" pitchFamily="49" charset="0"/>
+                <a:cs typeface="Courier New" panose="02070309020205020404" pitchFamily="49" charset="0"/>
+              </a:rPr>
+              <a:t>head</a:t>
+            </a:r>
+          </a:p>
+          <a:p>
+            <a:pPr marL="457200" indent="-457200">
+              <a:buFont typeface="+mj-lt"/>
+              <a:buAutoNum type="arabicPeriod"/>
+            </a:pPr>
+            <a:r>
+              <a:rPr lang="en-US" dirty="0">
+                <a:cs typeface="Courier New" panose="02070309020205020404" pitchFamily="49" charset="0"/>
+              </a:rPr>
+              <a:t>Change the background color of </a:t>
+            </a:r>
+            <a:r>
+              <a:rPr lang="en-US" dirty="0">
+                <a:latin typeface="Courier New" panose="02070309020205020404" pitchFamily="49" charset="0"/>
+                <a:cs typeface="Courier New" panose="02070309020205020404" pitchFamily="49" charset="0"/>
+              </a:rPr>
+              <a:t>body</a:t>
+            </a:r>
+            <a:r>
+              <a:rPr lang="en-US" dirty="0">
+                <a:cs typeface="Courier New" panose="02070309020205020404" pitchFamily="49" charset="0"/>
+              </a:rPr>
+              <a:t> (</a:t>
+            </a:r>
+            <a:r>
+              <a:rPr lang="en-US" dirty="0">
+                <a:cs typeface="Courier New" panose="02070309020205020404" pitchFamily="49" charset="0"/>
+                <a:hlinkClick r:id="rId2"/>
+              </a:rPr>
+              <a:t>reference guide</a:t>
+            </a:r>
+            <a:r>
+              <a:rPr lang="en-US" dirty="0">
+                <a:cs typeface="Courier New" panose="02070309020205020404" pitchFamily="49" charset="0"/>
+              </a:rPr>
+              <a:t>, </a:t>
+            </a:r>
+            <a:r>
+              <a:rPr lang="en-US" dirty="0">
+                <a:cs typeface="Courier New" panose="02070309020205020404" pitchFamily="49" charset="0"/>
+                <a:hlinkClick r:id="rId3"/>
+              </a:rPr>
+              <a:t>color codes</a:t>
+            </a:r>
+            <a:r>
+              <a:rPr lang="en-US" dirty="0">
+                <a:cs typeface="Courier New" panose="02070309020205020404" pitchFamily="49" charset="0"/>
+              </a:rPr>
+              <a:t>)</a:t>
+            </a:r>
+          </a:p>
+          <a:p>
+            <a:pPr marL="457200" indent="-457200">
+              <a:buFont typeface="+mj-lt"/>
+              <a:buAutoNum type="arabicPeriod"/>
+            </a:pPr>
+            <a:r>
+              <a:rPr lang="en-US" dirty="0">
+                <a:cs typeface="Courier New" panose="02070309020205020404" pitchFamily="49" charset="0"/>
+              </a:rPr>
+              <a:t>Give </a:t>
+            </a:r>
+            <a:r>
+              <a:rPr lang="en-US" dirty="0" err="1">
+                <a:latin typeface="Courier New" panose="02070309020205020404" pitchFamily="49" charset="0"/>
+                <a:cs typeface="Courier New" panose="02070309020205020404" pitchFamily="49" charset="0"/>
+              </a:rPr>
+              <a:t>img</a:t>
+            </a:r>
+            <a:r>
+              <a:rPr lang="en-US" dirty="0">
+                <a:cs typeface="Courier New" panose="02070309020205020404" pitchFamily="49" charset="0"/>
+              </a:rPr>
+              <a:t> an </a:t>
+            </a:r>
+            <a:r>
+              <a:rPr lang="en-US" dirty="0">
+                <a:latin typeface="Courier New" panose="02070309020205020404" pitchFamily="49" charset="0"/>
+                <a:cs typeface="Courier New" panose="02070309020205020404" pitchFamily="49" charset="0"/>
+              </a:rPr>
+              <a:t>id</a:t>
+            </a:r>
+            <a:r>
+              <a:rPr lang="en-US" dirty="0">
+                <a:cs typeface="Courier New" panose="02070309020205020404" pitchFamily="49" charset="0"/>
+              </a:rPr>
+              <a:t> and resize it</a:t>
+            </a:r>
+          </a:p>
+          <a:p>
+            <a:pPr marL="457200" indent="-457200">
+              <a:buFont typeface="+mj-lt"/>
+              <a:buAutoNum type="arabicPeriod"/>
+            </a:pPr>
+            <a:r>
+              <a:rPr lang="en-US" dirty="0">
+                <a:cs typeface="Courier New" panose="02070309020205020404" pitchFamily="49" charset="0"/>
+              </a:rPr>
+              <a:t>Change the color of </a:t>
+            </a:r>
+            <a:r>
+              <a:rPr lang="en-US" dirty="0">
+                <a:latin typeface="Courier New" panose="02070309020205020404" pitchFamily="49" charset="0"/>
+                <a:cs typeface="Courier New" panose="02070309020205020404" pitchFamily="49" charset="0"/>
+              </a:rPr>
+              <a:t>h1</a:t>
+            </a:r>
+            <a:endParaRPr lang="en-US" dirty="0">
+              <a:cs typeface="Courier New" panose="02070309020205020404" pitchFamily="49" charset="0"/>
+            </a:endParaRPr>
+          </a:p>
+          <a:p>
+            <a:pPr marL="457200" indent="-457200">
+              <a:buFont typeface="+mj-lt"/>
+              <a:buAutoNum type="arabicPeriod"/>
+            </a:pPr>
+            <a:endParaRPr lang="en-US" dirty="0">
+              <a:cs typeface="Courier New" panose="02070309020205020404" pitchFamily="49" charset="0"/>
+            </a:endParaRPr>
+          </a:p>
+          <a:p>
+            <a:endParaRPr lang="en-US" dirty="0">
+              <a:cs typeface="Courier New" panose="02070309020205020404" pitchFamily="49" charset="0"/>
+            </a:endParaRPr>
+          </a:p>
+        </p:txBody>
+      </p:sp>
+      <p:sp>
+        <p:nvSpPr>
+          <p:cNvPr id="4" name="Slide Number Placeholder 3">
+            <a:extLst>
+              <a:ext uri="{FF2B5EF4-FFF2-40B4-BE49-F238E27FC236}">
+                <a16:creationId xmlns:a16="http://schemas.microsoft.com/office/drawing/2014/main" id="{A6D87A8F-CF66-4849-941D-DDC0E0B179CA}"/>
+              </a:ext>
+            </a:extLst>
+          </p:cNvPr>
+          <p:cNvSpPr>
+            <a:spLocks noGrp="1"/>
+          </p:cNvSpPr>
+          <p:nvPr>
+            <p:ph type="sldNum" sz="quarter" idx="12"/>
+          </p:nvPr>
+        </p:nvSpPr>
+        <p:spPr/>
+        <p:txBody>
+          <a:bodyPr/>
+          <a:lstStyle/>
+          <a:p>
+            <a:fld id="{5D84065D-F351-4B03-BD91-D8A6B8D4B362}" type="slidenum">
+              <a:rPr lang="en-US" smtClean="0"/>
+              <a:t>11</a:t>
+            </a:fld>
+            <a:endParaRPr lang="en-US" dirty="0"/>
+          </a:p>
+        </p:txBody>
+      </p:sp>
+    </p:spTree>
+    <p:extLst>
+      <p:ext uri="{BB962C8B-B14F-4D97-AF65-F5344CB8AC3E}">
+        <p14:creationId xmlns:p14="http://schemas.microsoft.com/office/powerpoint/2010/main" val="3420663420"/>
+      </p:ext>
+    </p:extLst>
+  </p:cSld>
+  <p:clrMapOvr>
+    <a:masterClrMapping/>
+  </p:clrMapOvr>
+</p:sld>
+</file>
+
+<file path=ppt/slides/slide12.xml><?xml version="1.0" encoding="utf-8"?>
+<p:sld xmlns:a="http://schemas.openxmlformats.org/drawingml/2006/main" xmlns:r="http://schemas.openxmlformats.org/officeDocument/2006/relationships" xmlns:p="http://schemas.openxmlformats.org/presentationml/2006/main">
+  <p:cSld>
+    <p:spTree>
+      <p:nvGrpSpPr>
+        <p:cNvPr id="1" name=""/>
+        <p:cNvGrpSpPr/>
+        <p:nvPr/>
+      </p:nvGrpSpPr>
+      <p:grpSpPr>
+        <a:xfrm>
+          <a:off x="0" y="0"/>
+          <a:ext cx="0" cy="0"/>
+          <a:chOff x="0" y="0"/>
+          <a:chExt cx="0" cy="0"/>
+        </a:xfrm>
+      </p:grpSpPr>
+      <p:sp>
+        <p:nvSpPr>
+          <p:cNvPr id="2" name="Title 1">
+            <a:extLst>
+              <a:ext uri="{FF2B5EF4-FFF2-40B4-BE49-F238E27FC236}">
+                <a16:creationId xmlns:a16="http://schemas.microsoft.com/office/drawing/2014/main" id="{3566F657-855B-46C0-8055-896F84173E9B}"/>
+              </a:ext>
+            </a:extLst>
+          </p:cNvPr>
+          <p:cNvSpPr>
+            <a:spLocks noGrp="1"/>
+          </p:cNvSpPr>
+          <p:nvPr>
+            <p:ph type="title"/>
+          </p:nvPr>
+        </p:nvSpPr>
+        <p:spPr/>
+        <p:txBody>
+          <a:bodyPr/>
+          <a:lstStyle/>
+          <a:p>
+            <a:r>
+              <a:rPr lang="en-US" dirty="0"/>
+              <a:t>Hacking a Template</a:t>
+            </a:r>
+          </a:p>
+        </p:txBody>
+      </p:sp>
+      <p:sp>
+        <p:nvSpPr>
+          <p:cNvPr id="3" name="Content Placeholder 2">
+            <a:extLst>
+              <a:ext uri="{FF2B5EF4-FFF2-40B4-BE49-F238E27FC236}">
+                <a16:creationId xmlns:a16="http://schemas.microsoft.com/office/drawing/2014/main" id="{60BB6BFD-0987-440E-AA61-C9FDC54D8376}"/>
+              </a:ext>
+            </a:extLst>
+          </p:cNvPr>
+          <p:cNvSpPr>
+            <a:spLocks noGrp="1"/>
+          </p:cNvSpPr>
+          <p:nvPr>
+            <p:ph idx="1"/>
+          </p:nvPr>
+        </p:nvSpPr>
+        <p:spPr/>
+        <p:txBody>
+          <a:bodyPr/>
+          <a:lstStyle/>
+          <a:p>
+            <a:pPr marL="457200" indent="-457200">
+              <a:buFont typeface="+mj-lt"/>
+              <a:buAutoNum type="arabicPeriod"/>
+            </a:pPr>
+            <a:r>
+              <a:rPr lang="en-US" dirty="0"/>
+              <a:t>Download a basic free template </a:t>
+            </a:r>
+            <a:r>
+              <a:rPr lang="en-US" dirty="0">
+                <a:hlinkClick r:id="rId2"/>
+              </a:rPr>
+              <a:t>here</a:t>
+            </a:r>
+            <a:endParaRPr lang="en-US" dirty="0"/>
+          </a:p>
+          <a:p>
+            <a:pPr marL="457200" indent="-457200">
+              <a:buFont typeface="+mj-lt"/>
+              <a:buAutoNum type="arabicPeriod"/>
+            </a:pPr>
+            <a:r>
+              <a:rPr lang="en-US" dirty="0"/>
+              <a:t>Open the template and explore</a:t>
+            </a:r>
+          </a:p>
+          <a:p>
+            <a:pPr marL="457200" indent="-457200">
+              <a:buFont typeface="+mj-lt"/>
+              <a:buAutoNum type="arabicPeriod"/>
+            </a:pPr>
+            <a:r>
+              <a:rPr lang="en-US" dirty="0"/>
+              <a:t>Create a new stylesheet </a:t>
+            </a:r>
+            <a:r>
+              <a:rPr lang="en-US" dirty="0">
+                <a:latin typeface="Courier New" panose="02070309020205020404" pitchFamily="49" charset="0"/>
+                <a:cs typeface="Courier New" panose="02070309020205020404" pitchFamily="49" charset="0"/>
+              </a:rPr>
+              <a:t>my-styles.css </a:t>
+            </a:r>
+            <a:r>
+              <a:rPr lang="en-US" dirty="0">
+                <a:cs typeface="Courier New" panose="02070309020205020404" pitchFamily="49" charset="0"/>
+              </a:rPr>
+              <a:t>and copy the contents of </a:t>
+            </a:r>
+            <a:r>
+              <a:rPr lang="en-US" dirty="0">
+                <a:latin typeface="Courier New" panose="02070309020205020404" pitchFamily="49" charset="0"/>
+                <a:cs typeface="Courier New" panose="02070309020205020404" pitchFamily="49" charset="0"/>
+              </a:rPr>
+              <a:t>resume.css</a:t>
+            </a:r>
+          </a:p>
+          <a:p>
+            <a:pPr marL="457200" indent="-457200">
+              <a:buFont typeface="+mj-lt"/>
+              <a:buAutoNum type="arabicPeriod"/>
+            </a:pPr>
+            <a:r>
+              <a:rPr lang="en-US" dirty="0"/>
+              <a:t>Change the navigation (</a:t>
+            </a:r>
+            <a:r>
+              <a:rPr lang="en-US" sz="1800" dirty="0">
+                <a:latin typeface="Courier New" panose="02070309020205020404" pitchFamily="49" charset="0"/>
+                <a:cs typeface="Courier New" panose="02070309020205020404" pitchFamily="49" charset="0"/>
+              </a:rPr>
+              <a:t>.</a:t>
+            </a:r>
+            <a:r>
+              <a:rPr lang="en-US" sz="1800" dirty="0" err="1">
+                <a:latin typeface="Courier New" panose="02070309020205020404" pitchFamily="49" charset="0"/>
+                <a:cs typeface="Courier New" panose="02070309020205020404" pitchFamily="49" charset="0"/>
+              </a:rPr>
+              <a:t>bg</a:t>
+            </a:r>
+            <a:r>
+              <a:rPr lang="en-US" sz="1800" dirty="0">
+                <a:latin typeface="Courier New" panose="02070309020205020404" pitchFamily="49" charset="0"/>
+                <a:cs typeface="Courier New" panose="02070309020205020404" pitchFamily="49" charset="0"/>
+              </a:rPr>
+              <a:t>-primary</a:t>
+            </a:r>
+            <a:r>
+              <a:rPr lang="en-US" dirty="0"/>
+              <a:t>) and background color (</a:t>
+            </a:r>
+            <a:r>
+              <a:rPr lang="en-US" sz="1800" dirty="0" err="1">
+                <a:latin typeface="Courier New" panose="02070309020205020404" pitchFamily="49" charset="0"/>
+                <a:cs typeface="Courier New" panose="02070309020205020404" pitchFamily="49" charset="0"/>
+              </a:rPr>
+              <a:t>section.resume</a:t>
+            </a:r>
+            <a:r>
+              <a:rPr lang="en-US" sz="1800" dirty="0">
+                <a:latin typeface="Courier New" panose="02070309020205020404" pitchFamily="49" charset="0"/>
+                <a:cs typeface="Courier New" panose="02070309020205020404" pitchFamily="49" charset="0"/>
+              </a:rPr>
+              <a:t>-section</a:t>
+            </a:r>
+            <a:r>
+              <a:rPr lang="en-US" dirty="0"/>
+              <a:t>)</a:t>
+            </a:r>
+          </a:p>
+          <a:p>
+            <a:pPr marL="457200" indent="-457200">
+              <a:buFont typeface="+mj-lt"/>
+              <a:buAutoNum type="arabicPeriod"/>
+            </a:pPr>
+            <a:r>
+              <a:rPr lang="en-US" dirty="0"/>
+              <a:t>Fill in your personal information</a:t>
+            </a:r>
+          </a:p>
+        </p:txBody>
+      </p:sp>
+      <p:sp>
+        <p:nvSpPr>
+          <p:cNvPr id="4" name="Slide Number Placeholder 3">
+            <a:extLst>
+              <a:ext uri="{FF2B5EF4-FFF2-40B4-BE49-F238E27FC236}">
+                <a16:creationId xmlns:a16="http://schemas.microsoft.com/office/drawing/2014/main" id="{569C9641-5A18-CC40-8951-D2D4E834124B}"/>
+              </a:ext>
+            </a:extLst>
+          </p:cNvPr>
+          <p:cNvSpPr>
+            <a:spLocks noGrp="1"/>
+          </p:cNvSpPr>
+          <p:nvPr>
+            <p:ph type="sldNum" sz="quarter" idx="12"/>
+          </p:nvPr>
+        </p:nvSpPr>
+        <p:spPr/>
+        <p:txBody>
+          <a:bodyPr/>
+          <a:lstStyle/>
+          <a:p>
+            <a:fld id="{5D84065D-F351-4B03-BD91-D8A6B8D4B362}" type="slidenum">
+              <a:rPr lang="en-US" smtClean="0"/>
+              <a:t>12</a:t>
+            </a:fld>
+            <a:endParaRPr lang="en-US" dirty="0"/>
+          </a:p>
+        </p:txBody>
+      </p:sp>
+    </p:spTree>
+    <p:extLst>
+      <p:ext uri="{BB962C8B-B14F-4D97-AF65-F5344CB8AC3E}">
+        <p14:creationId xmlns:p14="http://schemas.microsoft.com/office/powerpoint/2010/main" val="4107747555"/>
+      </p:ext>
+    </p:extLst>
+  </p:cSld>
+  <p:clrMapOvr>
+    <a:masterClrMapping/>
+  </p:clrMapOvr>
+</p:sld>
+</file>
+
+<file path=ppt/slides/slide13.xml><?xml version="1.0" encoding="utf-8"?>
+<p:sld xmlns:a="http://schemas.openxmlformats.org/drawingml/2006/main" xmlns:r="http://schemas.openxmlformats.org/officeDocument/2006/relationships" xmlns:p="http://schemas.openxmlformats.org/presentationml/2006/main">
+  <p:cSld>
+    <p:spTree>
+      <p:nvGrpSpPr>
+        <p:cNvPr id="1" name=""/>
+        <p:cNvGrpSpPr/>
+        <p:nvPr/>
+      </p:nvGrpSpPr>
+      <p:grpSpPr>
+        <a:xfrm>
+          <a:off x="0" y="0"/>
+          <a:ext cx="0" cy="0"/>
+          <a:chOff x="0" y="0"/>
+          <a:chExt cx="0" cy="0"/>
+        </a:xfrm>
+      </p:grpSpPr>
+      <p:sp>
+        <p:nvSpPr>
+          <p:cNvPr id="2" name="Title 1">
+            <a:extLst>
+              <a:ext uri="{FF2B5EF4-FFF2-40B4-BE49-F238E27FC236}">
+                <a16:creationId xmlns:a16="http://schemas.microsoft.com/office/drawing/2014/main" id="{3BA00ADD-B846-4F61-9341-E0D85018B308}"/>
+              </a:ext>
+            </a:extLst>
+          </p:cNvPr>
+          <p:cNvSpPr>
+            <a:spLocks noGrp="1"/>
+          </p:cNvSpPr>
+          <p:nvPr>
+            <p:ph type="title"/>
+          </p:nvPr>
+        </p:nvSpPr>
+        <p:spPr/>
+        <p:txBody>
+          <a:bodyPr/>
+          <a:lstStyle/>
+          <a:p>
+            <a:r>
+              <a:rPr lang="en-US" dirty="0"/>
+              <a:t>Next Steps</a:t>
+            </a:r>
+          </a:p>
+        </p:txBody>
+      </p:sp>
+      <p:sp>
+        <p:nvSpPr>
+          <p:cNvPr id="3" name="Content Placeholder 2">
+            <a:extLst>
+              <a:ext uri="{FF2B5EF4-FFF2-40B4-BE49-F238E27FC236}">
+                <a16:creationId xmlns:a16="http://schemas.microsoft.com/office/drawing/2014/main" id="{3101A31F-4092-41EF-AA7C-B5E8B20DBEB2}"/>
+              </a:ext>
+            </a:extLst>
+          </p:cNvPr>
+          <p:cNvSpPr>
+            <a:spLocks noGrp="1"/>
+          </p:cNvSpPr>
+          <p:nvPr>
+            <p:ph idx="1"/>
+          </p:nvPr>
+        </p:nvSpPr>
+        <p:spPr/>
+        <p:txBody>
+          <a:bodyPr/>
+          <a:lstStyle/>
+          <a:p>
+            <a:r>
+              <a:rPr lang="en-US" dirty="0"/>
+              <a:t>Hosting</a:t>
+            </a:r>
+          </a:p>
+          <a:p>
+            <a:pPr lvl="1"/>
+            <a:r>
+              <a:rPr lang="en-US" dirty="0">
+                <a:hlinkClick r:id="rId2"/>
+              </a:rPr>
+              <a:t>Github Pages</a:t>
+            </a:r>
+            <a:r>
+              <a:rPr lang="en-US" dirty="0"/>
+              <a:t> (recommended for beginner)</a:t>
+            </a:r>
+          </a:p>
+          <a:p>
+            <a:pPr lvl="1"/>
+            <a:r>
+              <a:rPr lang="en-US" dirty="0">
+                <a:hlinkClick r:id="rId3"/>
+              </a:rPr>
+              <a:t>Amazon Web Services</a:t>
+            </a:r>
+            <a:endParaRPr lang="en-US" dirty="0"/>
+          </a:p>
+          <a:p>
+            <a:r>
+              <a:rPr lang="en-US" dirty="0"/>
+              <a:t>Domain Name</a:t>
+            </a:r>
+          </a:p>
+          <a:p>
+            <a:pPr lvl="1"/>
+            <a:r>
+              <a:rPr lang="en-US" dirty="0">
+                <a:hlinkClick r:id="rId4"/>
+              </a:rPr>
+              <a:t>Google Domains</a:t>
+            </a:r>
+            <a:endParaRPr lang="en-US" dirty="0"/>
+          </a:p>
+          <a:p>
+            <a:pPr lvl="1"/>
+            <a:r>
+              <a:rPr lang="en-US" dirty="0">
+                <a:hlinkClick r:id="rId5"/>
+              </a:rPr>
+              <a:t>Name Cheap</a:t>
+            </a:r>
+            <a:endParaRPr lang="en-US" dirty="0"/>
+          </a:p>
+        </p:txBody>
+      </p:sp>
+      <p:sp>
+        <p:nvSpPr>
+          <p:cNvPr id="4" name="Slide Number Placeholder 3">
+            <a:extLst>
+              <a:ext uri="{FF2B5EF4-FFF2-40B4-BE49-F238E27FC236}">
+                <a16:creationId xmlns:a16="http://schemas.microsoft.com/office/drawing/2014/main" id="{114B23C4-2488-AD4A-8281-E28F26991AD2}"/>
+              </a:ext>
+            </a:extLst>
+          </p:cNvPr>
+          <p:cNvSpPr>
+            <a:spLocks noGrp="1"/>
+          </p:cNvSpPr>
+          <p:nvPr>
+            <p:ph type="sldNum" sz="quarter" idx="12"/>
+          </p:nvPr>
+        </p:nvSpPr>
+        <p:spPr/>
+        <p:txBody>
+          <a:bodyPr/>
+          <a:lstStyle/>
+          <a:p>
+            <a:fld id="{5D84065D-F351-4B03-BD91-D8A6B8D4B362}" type="slidenum">
+              <a:rPr lang="en-US" smtClean="0"/>
+              <a:t>13</a:t>
+            </a:fld>
+            <a:endParaRPr lang="en-US" dirty="0"/>
+          </a:p>
+        </p:txBody>
+      </p:sp>
+    </p:spTree>
+    <p:extLst>
+      <p:ext uri="{BB962C8B-B14F-4D97-AF65-F5344CB8AC3E}">
+        <p14:creationId xmlns:p14="http://schemas.microsoft.com/office/powerpoint/2010/main" val="2852039442"/>
+      </p:ext>
+    </p:extLst>
+  </p:cSld>
+  <p:clrMapOvr>
+    <a:masterClrMapping/>
+  </p:clrMapOvr>
+</p:sld>
+</file>
+
+<file path=ppt/slides/slide14.xml><?xml version="1.0" encoding="utf-8"?>
+<p:sld xmlns:a="http://schemas.openxmlformats.org/drawingml/2006/main" xmlns:r="http://schemas.openxmlformats.org/officeDocument/2006/relationships" xmlns:p="http://schemas.openxmlformats.org/presentationml/2006/main">
+  <p:cSld>
+    <p:spTree>
+      <p:nvGrpSpPr>
+        <p:cNvPr id="1" name=""/>
+        <p:cNvGrpSpPr/>
+        <p:nvPr/>
+      </p:nvGrpSpPr>
+      <p:grpSpPr>
+        <a:xfrm>
+          <a:off x="0" y="0"/>
+          <a:ext cx="0" cy="0"/>
+          <a:chOff x="0" y="0"/>
+          <a:chExt cx="0" cy="0"/>
+        </a:xfrm>
+      </p:grpSpPr>
+      <p:sp>
+        <p:nvSpPr>
+          <p:cNvPr id="2" name="Title 1">
+            <a:extLst>
+              <a:ext uri="{FF2B5EF4-FFF2-40B4-BE49-F238E27FC236}">
                 <a16:creationId xmlns:a16="http://schemas.microsoft.com/office/drawing/2014/main" id="{6235AF22-00D3-43D3-B56E-72B4E2B9E528}"/>
               </a:ext>
             </a:extLst>
@@ -5925,6 +7251,35 @@
               <a:rPr lang="en-US" dirty="0"/>
               <a:t>Node.js</a:t>
             </a:r>
+          </a:p>
+        </p:txBody>
+      </p:sp>
+      <p:sp>
+        <p:nvSpPr>
+          <p:cNvPr id="4" name="Slide Number Placeholder 3">
+            <a:extLst>
+              <a:ext uri="{FF2B5EF4-FFF2-40B4-BE49-F238E27FC236}">
+                <a16:creationId xmlns:a16="http://schemas.microsoft.com/office/drawing/2014/main" id="{EEED0A6A-E251-614E-96C9-B6E112A41913}"/>
+              </a:ext>
+            </a:extLst>
+          </p:cNvPr>
+          <p:cNvSpPr>
+            <a:spLocks noGrp="1"/>
+          </p:cNvSpPr>
+          <p:nvPr>
+            <p:ph type="sldNum" sz="quarter" idx="12"/>
+          </p:nvPr>
+        </p:nvSpPr>
+        <p:spPr/>
+        <p:txBody>
+          <a:bodyPr/>
+          <a:lstStyle/>
+          <a:p>
+            <a:fld id="{5D84065D-F351-4B03-BD91-D8A6B8D4B362}" type="slidenum">
+              <a:rPr lang="en-US" smtClean="0"/>
+              <a:t>14</a:t>
+            </a:fld>
+            <a:endParaRPr lang="en-US" dirty="0"/>
           </a:p>
         </p:txBody>
       </p:sp>
@@ -5986,6 +7341,36 @@
           </a:p>
         </p:txBody>
       </p:sp>
+      <p:sp>
+        <p:nvSpPr>
+          <p:cNvPr id="3" name="Slide Number Placeholder 2">
+            <a:extLst>
+              <a:ext uri="{FF2B5EF4-FFF2-40B4-BE49-F238E27FC236}">
+                <a16:creationId xmlns:a16="http://schemas.microsoft.com/office/drawing/2014/main" id="{AE8DF27C-C7C2-6947-9C02-EC9EE58C4305}"/>
+              </a:ext>
+            </a:extLst>
+          </p:cNvPr>
+          <p:cNvSpPr>
+            <a:spLocks noGrp="1"/>
+          </p:cNvSpPr>
+          <p:nvPr>
+            <p:ph type="sldNum" sz="quarter" idx="12"/>
+          </p:nvPr>
+        </p:nvSpPr>
+        <p:spPr/>
+        <p:txBody>
+          <a:bodyPr/>
+          <a:lstStyle/>
+          <a:p>
+            <a:fld id="{D57F1E4F-1CFF-5643-939E-217C01CDF565}" type="slidenum">
+              <a:rPr lang="en-US" smtClean="0"/>
+              <a:pPr/>
+              <a:t>2</a:t>
+            </a:fld>
+            <a:endParaRPr lang="en-US" dirty="0"/>
+          </a:p>
+        </p:txBody>
+      </p:sp>
     </p:spTree>
     <p:extLst>
       <p:ext uri="{BB962C8B-B14F-4D97-AF65-F5344CB8AC3E}">
@@ -6125,6 +7510,35 @@
           </a:p>
         </p:txBody>
       </p:sp>
+      <p:sp>
+        <p:nvSpPr>
+          <p:cNvPr id="4" name="Slide Number Placeholder 3">
+            <a:extLst>
+              <a:ext uri="{FF2B5EF4-FFF2-40B4-BE49-F238E27FC236}">
+                <a16:creationId xmlns:a16="http://schemas.microsoft.com/office/drawing/2014/main" id="{E5BEF32F-A1D7-6846-9857-B1B0C894812B}"/>
+              </a:ext>
+            </a:extLst>
+          </p:cNvPr>
+          <p:cNvSpPr>
+            <a:spLocks noGrp="1"/>
+          </p:cNvSpPr>
+          <p:nvPr>
+            <p:ph type="sldNum" sz="quarter" idx="12"/>
+          </p:nvPr>
+        </p:nvSpPr>
+        <p:spPr/>
+        <p:txBody>
+          <a:bodyPr/>
+          <a:lstStyle/>
+          <a:p>
+            <a:fld id="{5D84065D-F351-4B03-BD91-D8A6B8D4B362}" type="slidenum">
+              <a:rPr lang="en-US" smtClean="0"/>
+              <a:t>3</a:t>
+            </a:fld>
+            <a:endParaRPr lang="en-US" dirty="0"/>
+          </a:p>
+        </p:txBody>
+      </p:sp>
     </p:spTree>
     <p:extLst>
       <p:ext uri="{BB962C8B-B14F-4D97-AF65-F5344CB8AC3E}">
@@ -6359,6 +7773,36 @@
           </a:p>
         </p:txBody>
       </p:sp>
+      <p:sp>
+        <p:nvSpPr>
+          <p:cNvPr id="3" name="Slide Number Placeholder 2">
+            <a:extLst>
+              <a:ext uri="{FF2B5EF4-FFF2-40B4-BE49-F238E27FC236}">
+                <a16:creationId xmlns:a16="http://schemas.microsoft.com/office/drawing/2014/main" id="{03A875D8-9E1E-664B-A0BE-0B82DCFCCB9A}"/>
+              </a:ext>
+            </a:extLst>
+          </p:cNvPr>
+          <p:cNvSpPr>
+            <a:spLocks noGrp="1"/>
+          </p:cNvSpPr>
+          <p:nvPr>
+            <p:ph type="sldNum" sz="quarter" idx="12"/>
+          </p:nvPr>
+        </p:nvSpPr>
+        <p:spPr/>
+        <p:txBody>
+          <a:bodyPr/>
+          <a:lstStyle/>
+          <a:p>
+            <a:fld id="{D57F1E4F-1CFF-5643-939E-217C01CDF565}" type="slidenum">
+              <a:rPr lang="en-US" smtClean="0"/>
+              <a:pPr/>
+              <a:t>4</a:t>
+            </a:fld>
+            <a:endParaRPr lang="en-US" dirty="0"/>
+          </a:p>
+        </p:txBody>
+      </p:sp>
     </p:spTree>
     <p:extLst>
       <p:ext uri="{BB962C8B-B14F-4D97-AF65-F5344CB8AC3E}">
@@ -6555,6 +7999,35 @@
           </a:p>
         </p:txBody>
       </p:sp>
+      <p:sp>
+        <p:nvSpPr>
+          <p:cNvPr id="3" name="Slide Number Placeholder 2">
+            <a:extLst>
+              <a:ext uri="{FF2B5EF4-FFF2-40B4-BE49-F238E27FC236}">
+                <a16:creationId xmlns:a16="http://schemas.microsoft.com/office/drawing/2014/main" id="{0D33C9FC-C5D4-8D49-B102-9D2575B4F27D}"/>
+              </a:ext>
+            </a:extLst>
+          </p:cNvPr>
+          <p:cNvSpPr>
+            <a:spLocks noGrp="1"/>
+          </p:cNvSpPr>
+          <p:nvPr>
+            <p:ph type="sldNum" sz="quarter" idx="12"/>
+          </p:nvPr>
+        </p:nvSpPr>
+        <p:spPr/>
+        <p:txBody>
+          <a:bodyPr/>
+          <a:lstStyle/>
+          <a:p>
+            <a:fld id="{5D84065D-F351-4B03-BD91-D8A6B8D4B362}" type="slidenum">
+              <a:rPr lang="en-US" smtClean="0"/>
+              <a:t>5</a:t>
+            </a:fld>
+            <a:endParaRPr lang="en-US" dirty="0"/>
+          </a:p>
+        </p:txBody>
+      </p:sp>
     </p:spTree>
     <p:extLst>
       <p:ext uri="{BB962C8B-B14F-4D97-AF65-F5344CB8AC3E}">
@@ -6590,7 +8063,7 @@
           <p:cNvPr id="2" name="Title 1">
             <a:extLst>
               <a:ext uri="{FF2B5EF4-FFF2-40B4-BE49-F238E27FC236}">
-                <a16:creationId xmlns:a16="http://schemas.microsoft.com/office/drawing/2014/main" id="{3EED8196-F18F-44AE-8ADB-26527D585945}"/>
+                <a16:creationId xmlns:a16="http://schemas.microsoft.com/office/drawing/2014/main" id="{A74F4594-45DF-2540-A392-3E6671175B1B}"/>
               </a:ext>
             </a:extLst>
           </p:cNvPr>
@@ -6608,7 +8081,7 @@
           <a:p>
             <a:r>
               <a:rPr lang="en-US" dirty="0"/>
-              <a:t>Baby’s First Webpage</a:t>
+              <a:t>HTML File Example</a:t>
             </a:r>
           </a:p>
         </p:txBody>
@@ -6618,7 +8091,7 @@
           <p:cNvPr id="3" name="Content Placeholder 2">
             <a:extLst>
               <a:ext uri="{FF2B5EF4-FFF2-40B4-BE49-F238E27FC236}">
-                <a16:creationId xmlns:a16="http://schemas.microsoft.com/office/drawing/2014/main" id="{461AEBD6-59F1-4ABE-8B67-9BB4E369969F}"/>
+                <a16:creationId xmlns:a16="http://schemas.microsoft.com/office/drawing/2014/main" id="{67F97B3F-B776-F54A-9B82-132D3B137993}"/>
               </a:ext>
             </a:extLst>
           </p:cNvPr>
@@ -6632,124 +8105,215 @@
         <p:spPr/>
         <p:txBody>
           <a:bodyPr>
-            <a:normAutofit fontScale="92500" lnSpcReduction="10000"/>
+            <a:normAutofit fontScale="85000" lnSpcReduction="20000"/>
           </a:bodyPr>
           <a:lstStyle/>
           <a:p>
-            <a:pPr marL="457200" indent="-457200">
-              <a:buFont typeface="+mj-lt"/>
-              <a:buAutoNum type="arabicPeriod"/>
+            <a:pPr marL="0" indent="0">
+              <a:buNone/>
             </a:pPr>
             <a:r>
-              <a:rPr lang="en-US" dirty="0"/>
-              <a:t>Open the </a:t>
-            </a:r>
+              <a:rPr lang="en-US" sz="1600" dirty="0">
+                <a:latin typeface="Courier" pitchFamily="2" charset="0"/>
+              </a:rPr>
+              <a:t>&lt;!DOCTYPE html&gt;</a:t>
+            </a:r>
+          </a:p>
+          <a:p>
+            <a:pPr marL="0" indent="0">
+              <a:buNone/>
+            </a:pPr>
+            <a:r>
+              <a:rPr lang="en-US" sz="1600" dirty="0">
+                <a:latin typeface="Courier" pitchFamily="2" charset="0"/>
+              </a:rPr>
+              <a:t>&lt;html&gt;</a:t>
+            </a:r>
+          </a:p>
+          <a:p>
+            <a:pPr marL="457200" lvl="1" indent="0">
+              <a:buNone/>
+            </a:pPr>
+            <a:r>
+              <a:rPr lang="en-US" sz="1600" dirty="0">
+                <a:latin typeface="Courier" pitchFamily="2" charset="0"/>
+              </a:rPr>
+              <a:t>&lt;head&gt;</a:t>
+            </a:r>
+          </a:p>
+          <a:p>
+            <a:pPr marL="457200" lvl="1" indent="0">
+              <a:buNone/>
+            </a:pPr>
+            <a:r>
+              <a:rPr lang="en-US" sz="1600" dirty="0">
+                <a:latin typeface="Courier" pitchFamily="2" charset="0"/>
+              </a:rPr>
+              <a:t>	&lt;title&gt;&lt;/title&gt;</a:t>
+            </a:r>
+          </a:p>
+          <a:p>
+            <a:pPr marL="457200" lvl="1" indent="0">
+              <a:buNone/>
+            </a:pPr>
+            <a:r>
+              <a:rPr lang="en-US" sz="1600" dirty="0">
+                <a:latin typeface="Courier" pitchFamily="2" charset="0"/>
+              </a:rPr>
+              <a:t>&lt;/head&gt;</a:t>
+            </a:r>
+          </a:p>
+          <a:p>
+            <a:pPr marL="457200" lvl="1" indent="0">
+              <a:buNone/>
+            </a:pPr>
+            <a:r>
+              <a:rPr lang="en-US" sz="1600" dirty="0">
+                <a:latin typeface="Courier" pitchFamily="2" charset="0"/>
+              </a:rPr>
+              <a:t>&lt;body&gt;</a:t>
+            </a:r>
+          </a:p>
+          <a:p>
+            <a:pPr marL="914400" lvl="2" indent="0">
+              <a:buNone/>
+            </a:pPr>
+            <a:r>
+              <a:rPr lang="en-US" sz="1600" dirty="0">
+                <a:latin typeface="Courier" pitchFamily="2" charset="0"/>
+              </a:rPr>
+              <a:t>&lt;h1&gt;&lt;/h1&gt;</a:t>
+            </a:r>
+          </a:p>
+          <a:p>
+            <a:pPr marL="914400" lvl="2" indent="0">
+              <a:buNone/>
+            </a:pPr>
+            <a:r>
+              <a:rPr lang="en-US" sz="1600" dirty="0">
+                <a:latin typeface="Courier" pitchFamily="2" charset="0"/>
+              </a:rPr>
+              <a:t>&lt;div&gt;</a:t>
+            </a:r>
+          </a:p>
+          <a:p>
+            <a:pPr marL="914400" lvl="2" indent="0">
+              <a:buNone/>
+            </a:pPr>
+            <a:r>
+              <a:rPr lang="en-US" sz="1600" dirty="0">
+                <a:latin typeface="Courier" pitchFamily="2" charset="0"/>
+              </a:rPr>
+              <a:t>&lt;/div&gt;</a:t>
+            </a:r>
+          </a:p>
+          <a:p>
+            <a:pPr marL="457200" lvl="1" indent="0">
+              <a:buNone/>
+            </a:pPr>
+            <a:r>
+              <a:rPr lang="en-US" sz="1600" dirty="0">
+                <a:latin typeface="Courier" pitchFamily="2" charset="0"/>
+              </a:rPr>
+              <a:t>&lt;/body&gt;</a:t>
+            </a:r>
+          </a:p>
+          <a:p>
+            <a:pPr marL="0" indent="0">
+              <a:buNone/>
+            </a:pPr>
+            <a:r>
+              <a:rPr lang="en-US" sz="1600" dirty="0">
+                <a:latin typeface="Courier" pitchFamily="2" charset="0"/>
+              </a:rPr>
+              <a:t>&lt;/html&gt;</a:t>
+            </a:r>
+          </a:p>
+        </p:txBody>
+      </p:sp>
+      <p:sp>
+        <p:nvSpPr>
+          <p:cNvPr id="4" name="Slide Number Placeholder 3">
+            <a:extLst>
+              <a:ext uri="{FF2B5EF4-FFF2-40B4-BE49-F238E27FC236}">
+                <a16:creationId xmlns:a16="http://schemas.microsoft.com/office/drawing/2014/main" id="{FC7D1111-EEB1-FA49-8738-96F8A8774D00}"/>
+              </a:ext>
+            </a:extLst>
+          </p:cNvPr>
+          <p:cNvSpPr>
+            <a:spLocks noGrp="1"/>
+          </p:cNvSpPr>
+          <p:nvPr>
+            <p:ph type="sldNum" sz="quarter" idx="12"/>
+          </p:nvPr>
+        </p:nvSpPr>
+        <p:spPr/>
+        <p:txBody>
+          <a:bodyPr/>
+          <a:lstStyle/>
+          <a:p>
+            <a:fld id="{5D84065D-F351-4B03-BD91-D8A6B8D4B362}" type="slidenum">
+              <a:rPr lang="en-US" smtClean="0"/>
+              <a:t>6</a:t>
+            </a:fld>
+            <a:endParaRPr lang="en-US" dirty="0"/>
+          </a:p>
+        </p:txBody>
+      </p:sp>
+      <p:sp>
+        <p:nvSpPr>
+          <p:cNvPr id="5" name="TextBox 4">
+            <a:extLst>
+              <a:ext uri="{FF2B5EF4-FFF2-40B4-BE49-F238E27FC236}">
+                <a16:creationId xmlns:a16="http://schemas.microsoft.com/office/drawing/2014/main" id="{55E372B7-FDA6-1442-AF67-B4F36917ED28}"/>
+              </a:ext>
+            </a:extLst>
+          </p:cNvPr>
+          <p:cNvSpPr txBox="1"/>
+          <p:nvPr/>
+        </p:nvSpPr>
+        <p:spPr>
+          <a:xfrm>
+            <a:off x="7086600" y="3754735"/>
+            <a:ext cx="3809997" cy="923330"/>
+          </a:xfrm>
+          <a:prstGeom prst="rect">
+            <a:avLst/>
+          </a:prstGeom>
+          <a:noFill/>
+        </p:spPr>
+        <p:txBody>
+          <a:bodyPr wrap="square" rtlCol="0">
+            <a:spAutoFit/>
+          </a:bodyPr>
+          <a:lstStyle/>
+          <a:p>
+            <a:pPr algn="ctr"/>
             <a:r>
               <a:rPr lang="en-US" dirty="0">
-                <a:latin typeface="Courier New" panose="02070309020205020404" pitchFamily="49" charset="0"/>
-                <a:cs typeface="Courier New" panose="02070309020205020404" pitchFamily="49" charset="0"/>
-              </a:rPr>
-              <a:t>index.html </a:t>
-            </a:r>
-            <a:r>
-              <a:rPr lang="en-US" dirty="0"/>
-              <a:t>in your text editor</a:t>
-            </a:r>
-          </a:p>
-          <a:p>
-            <a:pPr marL="457200" indent="-457200">
-              <a:buFont typeface="+mj-lt"/>
-              <a:buAutoNum type="arabicPeriod"/>
-            </a:pPr>
-            <a:r>
-              <a:rPr lang="en-US" dirty="0"/>
-              <a:t>Fill in the metadata and title tags</a:t>
-            </a:r>
-          </a:p>
-          <a:p>
-            <a:pPr marL="457200" indent="-457200">
-              <a:buFont typeface="+mj-lt"/>
-              <a:buAutoNum type="arabicPeriod"/>
-            </a:pPr>
-            <a:r>
-              <a:rPr lang="en-US" dirty="0"/>
-              <a:t>Open the file in your browser (refreshing the file after each step)</a:t>
-            </a:r>
-          </a:p>
-          <a:p>
-            <a:pPr marL="457200" indent="-457200">
-              <a:buFont typeface="+mj-lt"/>
-              <a:buAutoNum type="arabicPeriod"/>
-            </a:pPr>
-            <a:r>
-              <a:rPr lang="en-US" dirty="0"/>
-              <a:t>Add empty links to the </a:t>
-            </a:r>
-            <a:r>
-              <a:rPr lang="en-US" dirty="0" err="1">
-                <a:latin typeface="Courier New" panose="02070309020205020404" pitchFamily="49" charset="0"/>
-                <a:cs typeface="Courier New" panose="02070309020205020404" pitchFamily="49" charset="0"/>
-              </a:rPr>
-              <a:t>nav</a:t>
-            </a:r>
-            <a:r>
-              <a:rPr lang="en-US" dirty="0"/>
-              <a:t> section for Local Link, External Link, New Tab Link</a:t>
-            </a:r>
-          </a:p>
-          <a:p>
-            <a:pPr marL="457200" indent="-457200">
-              <a:buFont typeface="+mj-lt"/>
-              <a:buAutoNum type="arabicPeriod"/>
-            </a:pPr>
-            <a:r>
-              <a:rPr lang="en-US" dirty="0"/>
-              <a:t>Add a heading for About Me</a:t>
-            </a:r>
-          </a:p>
-          <a:p>
-            <a:pPr marL="457200" indent="-457200">
-              <a:buFont typeface="+mj-lt"/>
-              <a:buAutoNum type="arabicPeriod"/>
-            </a:pPr>
-            <a:r>
-              <a:rPr lang="en-US" dirty="0"/>
-              <a:t>Add an image of yourself (or of your </a:t>
-            </a:r>
-            <a:r>
-              <a:rPr lang="en-US" dirty="0">
-                <a:hlinkClick r:id="rId2"/>
-              </a:rPr>
-              <a:t>robot self</a:t>
-            </a:r>
-            <a:r>
-              <a:rPr lang="en-US" dirty="0"/>
-              <a:t>) and add a bio</a:t>
-            </a:r>
-          </a:p>
-          <a:p>
-            <a:pPr marL="457200" indent="-457200">
-              <a:buFont typeface="+mj-lt"/>
-              <a:buAutoNum type="arabicPeriod"/>
-            </a:pPr>
-            <a:r>
-              <a:rPr lang="en-US" dirty="0"/>
-              <a:t>Fill in the links and try them</a:t>
-            </a:r>
-          </a:p>
-          <a:p>
-            <a:pPr marL="457200" indent="-457200">
-              <a:buFont typeface="+mj-lt"/>
-              <a:buAutoNum type="arabicPeriod"/>
-            </a:pPr>
-            <a:endParaRPr lang="en-US" dirty="0"/>
+                <a:latin typeface="Courier" pitchFamily="2" charset="0"/>
+              </a:rPr>
+              <a:t>HTML files have a .html extension:</a:t>
+            </a:r>
+          </a:p>
+          <a:p>
+            <a:pPr algn="ctr"/>
+            <a:r>
+              <a:rPr lang="en-US" i="1" dirty="0" err="1">
+                <a:latin typeface="Courier" pitchFamily="2" charset="0"/>
+              </a:rPr>
+              <a:t>file.html</a:t>
+            </a:r>
+            <a:endParaRPr lang="en-US" i="1" dirty="0">
+              <a:latin typeface="Courier" pitchFamily="2" charset="0"/>
+            </a:endParaRPr>
           </a:p>
         </p:txBody>
       </p:sp>
     </p:spTree>
     <p:extLst>
       <p:ext uri="{BB962C8B-B14F-4D97-AF65-F5344CB8AC3E}">
-        <p14:creationId xmlns:p14="http://schemas.microsoft.com/office/powerpoint/2010/main" val="2253092250"/>
+        <p14:creationId xmlns:p14="http://schemas.microsoft.com/office/powerpoint/2010/main" val="2284316899"/>
       </p:ext>
     </p:extLst>
   </p:cSld>
@@ -6781,7 +8345,7 @@
           <p:cNvPr id="2" name="Title 1">
             <a:extLst>
               <a:ext uri="{FF2B5EF4-FFF2-40B4-BE49-F238E27FC236}">
-                <a16:creationId xmlns:a16="http://schemas.microsoft.com/office/drawing/2014/main" id="{7AE8A763-8EFC-41BE-A306-604D03EBF5C2}"/>
+                <a16:creationId xmlns:a16="http://schemas.microsoft.com/office/drawing/2014/main" id="{3EED8196-F18F-44AE-8ADB-26527D585945}"/>
               </a:ext>
             </a:extLst>
           </p:cNvPr>
@@ -6799,7 +8363,7 @@
           <a:p>
             <a:r>
               <a:rPr lang="en-US" dirty="0"/>
-              <a:t>Beautification: Attempt 1</a:t>
+              <a:t>First Webpage</a:t>
             </a:r>
           </a:p>
         </p:txBody>
@@ -6809,7 +8373,7 @@
           <p:cNvPr id="3" name="Content Placeholder 2">
             <a:extLst>
               <a:ext uri="{FF2B5EF4-FFF2-40B4-BE49-F238E27FC236}">
-                <a16:creationId xmlns:a16="http://schemas.microsoft.com/office/drawing/2014/main" id="{9B65B205-A428-44DD-86C4-F9CBBB3B1506}"/>
+                <a16:creationId xmlns:a16="http://schemas.microsoft.com/office/drawing/2014/main" id="{461AEBD6-59F1-4ABE-8B67-9BB4E369969F}"/>
               </a:ext>
             </a:extLst>
           </p:cNvPr>
@@ -6822,7 +8386,9 @@
         </p:nvSpPr>
         <p:spPr/>
         <p:txBody>
-          <a:bodyPr/>
+          <a:bodyPr>
+            <a:normAutofit fontScale="77500" lnSpcReduction="20000"/>
+          </a:bodyPr>
           <a:lstStyle/>
           <a:p>
             <a:pPr marL="457200" indent="-457200">
@@ -6831,14 +8397,25 @@
             </a:pPr>
             <a:r>
               <a:rPr lang="en-US" dirty="0"/>
-              <a:t>Create a file called </a:t>
+              <a:t>Open the </a:t>
             </a:r>
             <a:r>
               <a:rPr lang="en-US" dirty="0">
                 <a:latin typeface="Courier New" panose="02070309020205020404" pitchFamily="49" charset="0"/>
                 <a:cs typeface="Courier New" panose="02070309020205020404" pitchFamily="49" charset="0"/>
               </a:rPr>
-              <a:t>styles.css</a:t>
+              <a:t>index.html </a:t>
+            </a:r>
+            <a:r>
+              <a:rPr lang="en-US" dirty="0"/>
+              <a:t>in your text editor</a:t>
+            </a:r>
+          </a:p>
+          <a:p>
+            <a:pPr lvl="1"/>
+            <a:r>
+              <a:rPr lang="en-US" dirty="0"/>
+              <a:t>Note: you will have to use “open with”</a:t>
             </a:r>
           </a:p>
           <a:p>
@@ -6847,31 +8424,13 @@
               <a:buAutoNum type="arabicPeriod"/>
             </a:pPr>
             <a:r>
-              <a:rPr lang="en-US" dirty="0">
-                <a:cs typeface="Courier New" panose="02070309020205020404" pitchFamily="49" charset="0"/>
-              </a:rPr>
-              <a:t>Link the file to </a:t>
-            </a:r>
-            <a:r>
-              <a:rPr lang="en-US" dirty="0">
-                <a:latin typeface="Courier New" panose="02070309020205020404" pitchFamily="49" charset="0"/>
-                <a:cs typeface="Courier New" panose="02070309020205020404" pitchFamily="49" charset="0"/>
-              </a:rPr>
-              <a:t>index.html </a:t>
-            </a:r>
-            <a:r>
-              <a:rPr lang="en-US" dirty="0">
-                <a:cs typeface="Courier New" panose="02070309020205020404" pitchFamily="49" charset="0"/>
-              </a:rPr>
-              <a:t>in </a:t>
-            </a:r>
-            <a:r>
-              <a:rPr lang="en-US" dirty="0">
-                <a:latin typeface="Courier New" panose="02070309020205020404" pitchFamily="49" charset="0"/>
-                <a:cs typeface="Courier New" panose="02070309020205020404" pitchFamily="49" charset="0"/>
-              </a:rPr>
-              <a:t>head</a:t>
-            </a:r>
+              <a:rPr lang="en-US" dirty="0"/>
+              <a:t>Fill in the metadata and title tags</a:t>
+            </a:r>
+          </a:p>
+          <a:p>
+            <a:pPr lvl="1"/>
+            <a:endParaRPr lang="en-US" dirty="0"/>
           </a:p>
           <a:p>
             <a:pPr marL="457200" indent="-457200">
@@ -6879,49 +8438,8 @@
               <a:buAutoNum type="arabicPeriod"/>
             </a:pPr>
             <a:r>
-              <a:rPr lang="en-US" dirty="0">
-                <a:cs typeface="Courier New" panose="02070309020205020404" pitchFamily="49" charset="0"/>
-              </a:rPr>
-              <a:t>Change the background color of </a:t>
-            </a:r>
-            <a:r>
-              <a:rPr lang="en-US" dirty="0">
-                <a:latin typeface="Courier New" panose="02070309020205020404" pitchFamily="49" charset="0"/>
-                <a:cs typeface="Courier New" panose="02070309020205020404" pitchFamily="49" charset="0"/>
-              </a:rPr>
-              <a:t>body</a:t>
-            </a:r>
-            <a:r>
-              <a:rPr lang="en-US" dirty="0">
-                <a:cs typeface="Courier New" panose="02070309020205020404" pitchFamily="49" charset="0"/>
-              </a:rPr>
-              <a:t> (</a:t>
-            </a:r>
-            <a:r>
-              <a:rPr lang="en-US" dirty="0">
-                <a:cs typeface="Courier New" panose="02070309020205020404" pitchFamily="49" charset="0"/>
-                <a:hlinkClick r:id="rId2"/>
-              </a:rPr>
-              <a:t>reference guide</a:t>
-            </a:r>
-            <a:r>
-              <a:rPr lang="en-US" dirty="0">
-                <a:cs typeface="Courier New" panose="02070309020205020404" pitchFamily="49" charset="0"/>
-              </a:rPr>
-              <a:t>, </a:t>
-            </a:r>
-            <a:r>
-              <a:rPr lang="en-US" dirty="0">
-                <a:cs typeface="Courier New" panose="02070309020205020404" pitchFamily="49" charset="0"/>
-                <a:hlinkClick r:id="rId3"/>
-              </a:rPr>
-              <a:t>color codes</a:t>
-            </a:r>
-            <a:r>
-              <a:rPr lang="en-US" dirty="0">
-                <a:cs typeface="Courier New" panose="02070309020205020404" pitchFamily="49" charset="0"/>
-              </a:rPr>
-              <a:t>)</a:t>
+              <a:rPr lang="en-US" dirty="0"/>
+              <a:t>Open the file in your browser (refreshing the file after each step)</a:t>
             </a:r>
           </a:p>
           <a:p>
@@ -6930,36 +8448,19 @@
               <a:buAutoNum type="arabicPeriod"/>
             </a:pPr>
             <a:r>
-              <a:rPr lang="en-US" dirty="0">
-                <a:cs typeface="Courier New" panose="02070309020205020404" pitchFamily="49" charset="0"/>
-              </a:rPr>
-              <a:t>Give </a:t>
+              <a:rPr lang="en-US" dirty="0"/>
+              <a:t>Add empty links to the </a:t>
             </a:r>
             <a:r>
               <a:rPr lang="en-US" dirty="0" err="1">
                 <a:latin typeface="Courier New" panose="02070309020205020404" pitchFamily="49" charset="0"/>
                 <a:cs typeface="Courier New" panose="02070309020205020404" pitchFamily="49" charset="0"/>
               </a:rPr>
-              <a:t>img</a:t>
-            </a:r>
-            <a:r>
-              <a:rPr lang="en-US" dirty="0">
-                <a:cs typeface="Courier New" panose="02070309020205020404" pitchFamily="49" charset="0"/>
-              </a:rPr>
-              <a:t> an </a:t>
-            </a:r>
-            <a:r>
-              <a:rPr lang="en-US" dirty="0">
-                <a:latin typeface="Courier New" panose="02070309020205020404" pitchFamily="49" charset="0"/>
-                <a:cs typeface="Courier New" panose="02070309020205020404" pitchFamily="49" charset="0"/>
-              </a:rPr>
-              <a:t>id</a:t>
-            </a:r>
-            <a:r>
-              <a:rPr lang="en-US" dirty="0">
-                <a:cs typeface="Courier New" panose="02070309020205020404" pitchFamily="49" charset="0"/>
-              </a:rPr>
-              <a:t> and resize it</a:t>
+              <a:t>nav</a:t>
+            </a:r>
+            <a:r>
+              <a:rPr lang="en-US" dirty="0"/>
+              <a:t> section for Local Link, External Link, New Tab Link</a:t>
             </a:r>
           </a:p>
           <a:p>
@@ -6968,42 +8469,82 @@
               <a:buAutoNum type="arabicPeriod"/>
             </a:pPr>
             <a:r>
-              <a:rPr lang="en-US" dirty="0">
-                <a:cs typeface="Courier New" panose="02070309020205020404" pitchFamily="49" charset="0"/>
-              </a:rPr>
-              <a:t>Change the color of </a:t>
-            </a:r>
-            <a:r>
-              <a:rPr lang="en-US" dirty="0">
-                <a:latin typeface="Courier New" panose="02070309020205020404" pitchFamily="49" charset="0"/>
-                <a:cs typeface="Courier New" panose="02070309020205020404" pitchFamily="49" charset="0"/>
-              </a:rPr>
-              <a:t>h1</a:t>
-            </a:r>
-            <a:endParaRPr lang="en-US" dirty="0">
-              <a:cs typeface="Courier New" panose="02070309020205020404" pitchFamily="49" charset="0"/>
-            </a:endParaRPr>
+              <a:rPr lang="en-US" dirty="0"/>
+              <a:t>Add a heading for About Me</a:t>
+            </a:r>
           </a:p>
           <a:p>
             <a:pPr marL="457200" indent="-457200">
               <a:buFont typeface="+mj-lt"/>
               <a:buAutoNum type="arabicPeriod"/>
             </a:pPr>
-            <a:endParaRPr lang="en-US" dirty="0">
-              <a:cs typeface="Courier New" panose="02070309020205020404" pitchFamily="49" charset="0"/>
-            </a:endParaRPr>
-          </a:p>
-          <a:p>
-            <a:endParaRPr lang="en-US" dirty="0">
-              <a:cs typeface="Courier New" panose="02070309020205020404" pitchFamily="49" charset="0"/>
-            </a:endParaRPr>
+            <a:r>
+              <a:rPr lang="en-US" dirty="0"/>
+              <a:t>Add an image of yourself (or of your </a:t>
+            </a:r>
+            <a:r>
+              <a:rPr lang="en-US" dirty="0">
+                <a:hlinkClick r:id="rId2"/>
+              </a:rPr>
+              <a:t>robot self</a:t>
+            </a:r>
+            <a:r>
+              <a:rPr lang="en-US" dirty="0"/>
+              <a:t>) and add a bio</a:t>
+            </a:r>
+          </a:p>
+          <a:p>
+            <a:pPr marL="457200" indent="-457200">
+              <a:buFont typeface="+mj-lt"/>
+              <a:buAutoNum type="arabicPeriod"/>
+            </a:pPr>
+            <a:r>
+              <a:rPr lang="en-US" dirty="0"/>
+              <a:t>Fill in the links and try them</a:t>
+            </a:r>
+          </a:p>
+          <a:p>
+            <a:pPr marL="457200" indent="-457200">
+              <a:buFont typeface="+mj-lt"/>
+              <a:buAutoNum type="arabicPeriod"/>
+            </a:pPr>
+            <a:endParaRPr lang="en-US" dirty="0"/>
+          </a:p>
+        </p:txBody>
+      </p:sp>
+      <p:sp>
+        <p:nvSpPr>
+          <p:cNvPr id="4" name="Slide Number Placeholder 3">
+            <a:extLst>
+              <a:ext uri="{FF2B5EF4-FFF2-40B4-BE49-F238E27FC236}">
+                <a16:creationId xmlns:a16="http://schemas.microsoft.com/office/drawing/2014/main" id="{35AD8951-9162-3E41-975E-6F28D84CDBAC}"/>
+              </a:ext>
+            </a:extLst>
+          </p:cNvPr>
+          <p:cNvSpPr>
+            <a:spLocks noGrp="1"/>
+          </p:cNvSpPr>
+          <p:nvPr>
+            <p:ph type="sldNum" sz="quarter" idx="12"/>
+          </p:nvPr>
+        </p:nvSpPr>
+        <p:spPr/>
+        <p:txBody>
+          <a:bodyPr/>
+          <a:lstStyle/>
+          <a:p>
+            <a:fld id="{5D84065D-F351-4B03-BD91-D8A6B8D4B362}" type="slidenum">
+              <a:rPr lang="en-US" smtClean="0"/>
+              <a:t>7</a:t>
+            </a:fld>
+            <a:endParaRPr lang="en-US" dirty="0"/>
           </a:p>
         </p:txBody>
       </p:sp>
     </p:spTree>
     <p:extLst>
       <p:ext uri="{BB962C8B-B14F-4D97-AF65-F5344CB8AC3E}">
-        <p14:creationId xmlns:p14="http://schemas.microsoft.com/office/powerpoint/2010/main" val="3420663420"/>
+        <p14:creationId xmlns:p14="http://schemas.microsoft.com/office/powerpoint/2010/main" val="2253092250"/>
       </p:ext>
     </p:extLst>
   </p:cSld>
@@ -7035,7 +8576,7 @@
           <p:cNvPr id="2" name="Title 1">
             <a:extLst>
               <a:ext uri="{FF2B5EF4-FFF2-40B4-BE49-F238E27FC236}">
-                <a16:creationId xmlns:a16="http://schemas.microsoft.com/office/drawing/2014/main" id="{3566F657-855B-46C0-8055-896F84173E9B}"/>
+                <a16:creationId xmlns:a16="http://schemas.microsoft.com/office/drawing/2014/main" id="{3EED8196-F18F-44AE-8ADB-26527D585945}"/>
               </a:ext>
             </a:extLst>
           </p:cNvPr>
@@ -7053,7 +8594,7 @@
           <a:p>
             <a:r>
               <a:rPr lang="en-US" dirty="0"/>
-              <a:t>Hacking a Template</a:t>
+              <a:t>First Webpage: Head</a:t>
             </a:r>
           </a:p>
         </p:txBody>
@@ -7063,7 +8604,7 @@
           <p:cNvPr id="3" name="Content Placeholder 2">
             <a:extLst>
               <a:ext uri="{FF2B5EF4-FFF2-40B4-BE49-F238E27FC236}">
-                <a16:creationId xmlns:a16="http://schemas.microsoft.com/office/drawing/2014/main" id="{60BB6BFD-0987-440E-AA61-C9FDC54D8376}"/>
+                <a16:creationId xmlns:a16="http://schemas.microsoft.com/office/drawing/2014/main" id="{461AEBD6-59F1-4ABE-8B67-9BB4E369969F}"/>
               </a:ext>
             </a:extLst>
           </p:cNvPr>
@@ -7076,7 +8617,9 @@
         </p:nvSpPr>
         <p:spPr/>
         <p:txBody>
-          <a:bodyPr/>
+          <a:bodyPr>
+            <a:normAutofit/>
+          </a:bodyPr>
           <a:lstStyle/>
           <a:p>
             <a:pPr marL="457200" indent="-457200">
@@ -7085,15 +8628,8 @@
             </a:pPr>
             <a:r>
               <a:rPr lang="en-US" dirty="0"/>
-              <a:t>Download a basic free template </a:t>
-            </a:r>
-            <a:r>
-              <a:rPr lang="en-US" dirty="0">
-                <a:hlinkClick r:id="rId2"/>
-              </a:rPr>
-              <a:t>here</a:t>
-            </a:r>
-            <a:endParaRPr lang="en-US" dirty="0"/>
+              <a:t>Open the file in your browser (refreshing the file after each step)</a:t>
+            </a:r>
           </a:p>
           <a:p>
             <a:pPr marL="457200" indent="-457200">
@@ -7102,7 +8638,32 @@
             </a:pPr>
             <a:r>
               <a:rPr lang="en-US" dirty="0"/>
-              <a:t>Open the template and explore</a:t>
+              <a:t>Open the </a:t>
+            </a:r>
+            <a:r>
+              <a:rPr lang="en-US" dirty="0" err="1">
+                <a:latin typeface="Courier New" panose="02070309020205020404" pitchFamily="49" charset="0"/>
+                <a:cs typeface="Courier New" panose="02070309020205020404" pitchFamily="49" charset="0"/>
+              </a:rPr>
+              <a:t>index.html</a:t>
+            </a:r>
+            <a:r>
+              <a:rPr lang="en-US" dirty="0">
+                <a:latin typeface="Courier New" panose="02070309020205020404" pitchFamily="49" charset="0"/>
+                <a:cs typeface="Courier New" panose="02070309020205020404" pitchFamily="49" charset="0"/>
+              </a:rPr>
+              <a:t> </a:t>
+            </a:r>
+            <a:r>
+              <a:rPr lang="en-US" dirty="0"/>
+              <a:t>in your text editor</a:t>
+            </a:r>
+          </a:p>
+          <a:p>
+            <a:pPr lvl="1"/>
+            <a:r>
+              <a:rPr lang="en-US" dirty="0"/>
+              <a:t>Note: you will have to use “open with”</a:t>
             </a:r>
           </a:p>
           <a:p>
@@ -7112,98 +8673,66 @@
             </a:pPr>
             <a:r>
               <a:rPr lang="en-US" dirty="0"/>
-              <a:t>Create a new stylesheet </a:t>
-            </a:r>
-            <a:r>
-              <a:rPr lang="en-US" dirty="0">
-                <a:latin typeface="Courier New" panose="02070309020205020404" pitchFamily="49" charset="0"/>
-                <a:cs typeface="Courier New" panose="02070309020205020404" pitchFamily="49" charset="0"/>
-              </a:rPr>
-              <a:t>my-styles.css </a:t>
-            </a:r>
-            <a:r>
-              <a:rPr lang="en-US" dirty="0">
-                <a:cs typeface="Courier New" panose="02070309020205020404" pitchFamily="49" charset="0"/>
-              </a:rPr>
-              <a:t>and copy the contents of </a:t>
-            </a:r>
-            <a:r>
-              <a:rPr lang="en-US" dirty="0">
-                <a:latin typeface="Courier New" panose="02070309020205020404" pitchFamily="49" charset="0"/>
-                <a:cs typeface="Courier New" panose="02070309020205020404" pitchFamily="49" charset="0"/>
-              </a:rPr>
-              <a:t>resume.css</a:t>
-            </a:r>
-          </a:p>
-          <a:p>
-            <a:pPr marL="457200" indent="-457200">
-              <a:buFont typeface="+mj-lt"/>
-              <a:buAutoNum type="arabicPeriod"/>
-            </a:pPr>
-            <a:r>
-              <a:rPr lang="en-US" dirty="0"/>
-              <a:t>Change the navigation (</a:t>
-            </a:r>
-            <a:r>
-              <a:rPr lang="en-US" sz="1800" dirty="0">
-                <a:latin typeface="Courier New" panose="02070309020205020404" pitchFamily="49" charset="0"/>
-                <a:cs typeface="Courier New" panose="02070309020205020404" pitchFamily="49" charset="0"/>
-              </a:rPr>
-              <a:t>.</a:t>
-            </a:r>
-            <a:r>
-              <a:rPr lang="en-US" sz="1800" dirty="0" err="1">
-                <a:latin typeface="Courier New" panose="02070309020205020404" pitchFamily="49" charset="0"/>
-                <a:cs typeface="Courier New" panose="02070309020205020404" pitchFamily="49" charset="0"/>
-              </a:rPr>
-              <a:t>bg</a:t>
-            </a:r>
-            <a:r>
-              <a:rPr lang="en-US" sz="1800" dirty="0">
-                <a:latin typeface="Courier New" panose="02070309020205020404" pitchFamily="49" charset="0"/>
-                <a:cs typeface="Courier New" panose="02070309020205020404" pitchFamily="49" charset="0"/>
-              </a:rPr>
-              <a:t>-primary</a:t>
-            </a:r>
-            <a:r>
-              <a:rPr lang="en-US" dirty="0"/>
-              <a:t>) and background color (</a:t>
-            </a:r>
-            <a:r>
-              <a:rPr lang="en-US" sz="1800" dirty="0" err="1">
-                <a:latin typeface="Courier New" panose="02070309020205020404" pitchFamily="49" charset="0"/>
-                <a:cs typeface="Courier New" panose="02070309020205020404" pitchFamily="49" charset="0"/>
-              </a:rPr>
-              <a:t>section.resume</a:t>
-            </a:r>
-            <a:r>
-              <a:rPr lang="en-US" sz="1800" dirty="0">
-                <a:latin typeface="Courier New" panose="02070309020205020404" pitchFamily="49" charset="0"/>
-                <a:cs typeface="Courier New" panose="02070309020205020404" pitchFamily="49" charset="0"/>
-              </a:rPr>
-              <a:t>-section</a:t>
-            </a:r>
-            <a:r>
-              <a:rPr lang="en-US" dirty="0"/>
-              <a:t>)</a:t>
-            </a:r>
-          </a:p>
-          <a:p>
-            <a:pPr marL="457200" indent="-457200">
-              <a:buFont typeface="+mj-lt"/>
-              <a:buAutoNum type="arabicPeriod"/>
-            </a:pPr>
-            <a:r>
-              <a:rPr lang="en-US" dirty="0"/>
-              <a:t>Fill in your personal information</a:t>
-            </a:r>
+              <a:t>Fill in the metadata and title tags in the head</a:t>
+            </a:r>
+          </a:p>
+          <a:p>
+            <a:pPr lvl="1"/>
+            <a:r>
+              <a:rPr lang="en-US" dirty="0"/>
+              <a:t>Add a description, “example web page” in quotes next to “content=”</a:t>
+            </a:r>
+          </a:p>
+          <a:p>
+            <a:pPr lvl="1"/>
+            <a:r>
+              <a:rPr lang="en-US" dirty="0"/>
+              <a:t>Add a title </a:t>
+            </a:r>
+            <a:r>
+              <a:rPr lang="en-US" dirty="0" err="1"/>
+              <a:t>inbetween</a:t>
+            </a:r>
+            <a:r>
+              <a:rPr lang="en-US" dirty="0"/>
+              <a:t> the &lt;title&gt; tags, like &lt;title&gt;My Portfolio&lt;/title&gt;. Note: do not use quotes</a:t>
+            </a:r>
+          </a:p>
+        </p:txBody>
+      </p:sp>
+      <p:sp>
+        <p:nvSpPr>
+          <p:cNvPr id="4" name="Slide Number Placeholder 3">
+            <a:extLst>
+              <a:ext uri="{FF2B5EF4-FFF2-40B4-BE49-F238E27FC236}">
+                <a16:creationId xmlns:a16="http://schemas.microsoft.com/office/drawing/2014/main" id="{35AD8951-9162-3E41-975E-6F28D84CDBAC}"/>
+              </a:ext>
+            </a:extLst>
+          </p:cNvPr>
+          <p:cNvSpPr>
+            <a:spLocks noGrp="1"/>
+          </p:cNvSpPr>
+          <p:nvPr>
+            <p:ph type="sldNum" sz="quarter" idx="12"/>
+          </p:nvPr>
+        </p:nvSpPr>
+        <p:spPr/>
+        <p:txBody>
+          <a:bodyPr/>
+          <a:lstStyle/>
+          <a:p>
+            <a:fld id="{5D84065D-F351-4B03-BD91-D8A6B8D4B362}" type="slidenum">
+              <a:rPr lang="en-US" smtClean="0"/>
+              <a:t>8</a:t>
+            </a:fld>
+            <a:endParaRPr lang="en-US" dirty="0"/>
           </a:p>
         </p:txBody>
       </p:sp>
     </p:spTree>
     <p:extLst>
       <p:ext uri="{BB962C8B-B14F-4D97-AF65-F5344CB8AC3E}">
-        <p14:creationId xmlns:p14="http://schemas.microsoft.com/office/powerpoint/2010/main" val="4107747555"/>
+        <p14:creationId xmlns:p14="http://schemas.microsoft.com/office/powerpoint/2010/main" val="1727133080"/>
       </p:ext>
     </p:extLst>
   </p:cSld>
@@ -7235,7 +8764,7 @@
           <p:cNvPr id="2" name="Title 1">
             <a:extLst>
               <a:ext uri="{FF2B5EF4-FFF2-40B4-BE49-F238E27FC236}">
-                <a16:creationId xmlns:a16="http://schemas.microsoft.com/office/drawing/2014/main" id="{3BA00ADD-B846-4F61-9341-E0D85018B308}"/>
+                <a16:creationId xmlns:a16="http://schemas.microsoft.com/office/drawing/2014/main" id="{686DA4E1-048E-C845-B65A-855B495566C2}"/>
               </a:ext>
             </a:extLst>
           </p:cNvPr>
@@ -7253,7 +8782,7 @@
           <a:p>
             <a:r>
               <a:rPr lang="en-US" dirty="0"/>
-              <a:t>Next Steps</a:t>
+              <a:t>First Webpage: Body</a:t>
             </a:r>
           </a:p>
         </p:txBody>
@@ -7263,7 +8792,7 @@
           <p:cNvPr id="3" name="Content Placeholder 2">
             <a:extLst>
               <a:ext uri="{FF2B5EF4-FFF2-40B4-BE49-F238E27FC236}">
-                <a16:creationId xmlns:a16="http://schemas.microsoft.com/office/drawing/2014/main" id="{3101A31F-4092-41EF-AA7C-B5E8B20DBEB2}"/>
+                <a16:creationId xmlns:a16="http://schemas.microsoft.com/office/drawing/2014/main" id="{B5733112-70FA-0A43-B9BA-C0C69EABFE79}"/>
               </a:ext>
             </a:extLst>
           </p:cNvPr>
@@ -7276,61 +8805,153 @@
         </p:nvSpPr>
         <p:spPr/>
         <p:txBody>
+          <a:bodyPr>
+            <a:normAutofit lnSpcReduction="10000"/>
+          </a:bodyPr>
+          <a:lstStyle/>
+          <a:p>
+            <a:pPr marL="457200" indent="-457200">
+              <a:buFont typeface="+mj-lt"/>
+              <a:buAutoNum type="arabicPeriod"/>
+            </a:pPr>
+            <a:r>
+              <a:rPr lang="en-US" dirty="0"/>
+              <a:t>Add a heading for About Me</a:t>
+            </a:r>
+          </a:p>
+          <a:p>
+            <a:pPr lvl="1"/>
+            <a:r>
+              <a:rPr lang="en-US" dirty="0">
+                <a:latin typeface="Courier" pitchFamily="2" charset="0"/>
+              </a:rPr>
+              <a:t>&lt;h1&gt;About Me&lt;/h1&gt;</a:t>
+            </a:r>
+          </a:p>
+          <a:p>
+            <a:pPr lvl="1"/>
+            <a:r>
+              <a:rPr lang="en-US" dirty="0"/>
+              <a:t>Note: the number on the tag corresponds to the size of the text, with 1 as largest and 6 as smallest</a:t>
+            </a:r>
+          </a:p>
+          <a:p>
+            <a:pPr marL="457200" indent="-457200">
+              <a:buFont typeface="+mj-lt"/>
+              <a:buAutoNum type="arabicPeriod"/>
+            </a:pPr>
+            <a:r>
+              <a:rPr lang="en-US" dirty="0"/>
+              <a:t>Add an image of yourself (or use </a:t>
+            </a:r>
+            <a:r>
+              <a:rPr lang="en-US" dirty="0">
+                <a:latin typeface="Courier" pitchFamily="2" charset="0"/>
+              </a:rPr>
+              <a:t>media/</a:t>
+            </a:r>
+            <a:r>
+              <a:rPr lang="en-US" dirty="0" err="1">
+                <a:latin typeface="Courier" pitchFamily="2" charset="0"/>
+              </a:rPr>
+              <a:t>portrait.jpg</a:t>
+            </a:r>
+            <a:r>
+              <a:rPr lang="en-US" dirty="0"/>
+              <a:t>) </a:t>
+            </a:r>
+          </a:p>
+          <a:p>
+            <a:pPr lvl="1"/>
+            <a:r>
+              <a:rPr lang="en-US" dirty="0">
+                <a:latin typeface="Courier" pitchFamily="2" charset="0"/>
+              </a:rPr>
+              <a:t>&lt;</a:t>
+            </a:r>
+            <a:r>
+              <a:rPr lang="en-US" dirty="0" err="1">
+                <a:latin typeface="Courier" pitchFamily="2" charset="0"/>
+              </a:rPr>
+              <a:t>img</a:t>
+            </a:r>
+            <a:r>
+              <a:rPr lang="en-US" dirty="0">
+                <a:latin typeface="Courier" pitchFamily="2" charset="0"/>
+              </a:rPr>
+              <a:t> </a:t>
+            </a:r>
+            <a:r>
+              <a:rPr lang="en-US" dirty="0" err="1">
+                <a:latin typeface="Courier" pitchFamily="2" charset="0"/>
+              </a:rPr>
+              <a:t>src</a:t>
+            </a:r>
+            <a:r>
+              <a:rPr lang="en-US" dirty="0">
+                <a:latin typeface="Courier" pitchFamily="2" charset="0"/>
+              </a:rPr>
+              <a:t>=“media/</a:t>
+            </a:r>
+            <a:r>
+              <a:rPr lang="en-US" dirty="0" err="1">
+                <a:latin typeface="Courier" pitchFamily="2" charset="0"/>
+              </a:rPr>
+              <a:t>portrait.jpg</a:t>
+            </a:r>
+            <a:r>
+              <a:rPr lang="en-US" dirty="0">
+                <a:latin typeface="Courier" pitchFamily="2" charset="0"/>
+              </a:rPr>
+              <a:t>”&gt;</a:t>
+            </a:r>
+          </a:p>
+          <a:p>
+            <a:pPr marL="457200" indent="-457200">
+              <a:buFont typeface="+mj-lt"/>
+              <a:buAutoNum type="arabicPeriod"/>
+            </a:pPr>
+            <a:r>
+              <a:rPr lang="en-US" dirty="0"/>
+              <a:t>Add a bio under About Me</a:t>
+            </a:r>
+          </a:p>
+          <a:p>
+            <a:pPr lvl="1"/>
+            <a:r>
+              <a:rPr lang="en-US" dirty="0">
+                <a:latin typeface="Courier" pitchFamily="2" charset="0"/>
+              </a:rPr>
+              <a:t>&lt;p&gt;some text&lt;/p&gt;</a:t>
+            </a:r>
+          </a:p>
+        </p:txBody>
+      </p:sp>
+      <p:sp>
+        <p:nvSpPr>
+          <p:cNvPr id="4" name="Slide Number Placeholder 3">
+            <a:extLst>
+              <a:ext uri="{FF2B5EF4-FFF2-40B4-BE49-F238E27FC236}">
+                <a16:creationId xmlns:a16="http://schemas.microsoft.com/office/drawing/2014/main" id="{326F40D1-649E-2F4B-8B8C-B386B7040E4D}"/>
+              </a:ext>
+            </a:extLst>
+          </p:cNvPr>
+          <p:cNvSpPr>
+            <a:spLocks noGrp="1"/>
+          </p:cNvSpPr>
+          <p:nvPr>
+            <p:ph type="sldNum" sz="quarter" idx="12"/>
+          </p:nvPr>
+        </p:nvSpPr>
+        <p:spPr/>
+        <p:txBody>
           <a:bodyPr/>
           <a:lstStyle/>
           <a:p>
-            <a:r>
-              <a:rPr lang="en-US" dirty="0"/>
-              <a:t>Hosting</a:t>
-            </a:r>
-          </a:p>
-          <a:p>
-            <a:pPr lvl="1"/>
-            <a:r>
-              <a:rPr lang="en-US" dirty="0">
-                <a:hlinkClick r:id="rId2"/>
-              </a:rPr>
-              <a:t>Github Pages</a:t>
-            </a:r>
-            <a:r>
-              <a:rPr lang="en-US" dirty="0"/>
-              <a:t> (recommended for beginner)</a:t>
-            </a:r>
-          </a:p>
-          <a:p>
-            <a:pPr lvl="1"/>
-            <a:r>
-              <a:rPr lang="en-US" dirty="0">
-                <a:hlinkClick r:id="rId3"/>
-              </a:rPr>
-              <a:t>Amazon Web Services</a:t>
-            </a:r>
-            <a:endParaRPr lang="en-US" dirty="0"/>
-          </a:p>
-          <a:p>
-            <a:r>
-              <a:rPr lang="en-US" dirty="0"/>
-              <a:t>Domain Name</a:t>
-            </a:r>
-          </a:p>
-          <a:p>
-            <a:pPr lvl="1"/>
-            <a:r>
-              <a:rPr lang="en-US" dirty="0">
-                <a:hlinkClick r:id="rId4"/>
-              </a:rPr>
-              <a:t>Google Domains</a:t>
-            </a:r>
-            <a:endParaRPr lang="en-US" dirty="0"/>
-          </a:p>
-          <a:p>
-            <a:pPr lvl="1"/>
-            <a:r>
-              <a:rPr lang="en-US" dirty="0">
-                <a:hlinkClick r:id="rId5"/>
-              </a:rPr>
-              <a:t>Name Cheap</a:t>
-            </a:r>
+            <a:fld id="{5D84065D-F351-4B03-BD91-D8A6B8D4B362}" type="slidenum">
+              <a:rPr lang="en-US" smtClean="0"/>
+              <a:t>9</a:t>
+            </a:fld>
             <a:endParaRPr lang="en-US" dirty="0"/>
           </a:p>
         </p:txBody>
@@ -7338,7 +8959,7 @@
     </p:spTree>
     <p:extLst>
       <p:ext uri="{BB962C8B-B14F-4D97-AF65-F5344CB8AC3E}">
-        <p14:creationId xmlns:p14="http://schemas.microsoft.com/office/powerpoint/2010/main" val="2852039442"/>
+        <p14:creationId xmlns:p14="http://schemas.microsoft.com/office/powerpoint/2010/main" val="3270815634"/>
       </p:ext>
     </p:extLst>
   </p:cSld>
@@ -7579,4 +9200,299 @@
     </a:ext>
   </a:extLst>
 </a:theme>
+</file>
+
+<file path=ppt/theme/theme2.xml><?xml version="1.0" encoding="utf-8"?>
+<a:theme xmlns:a="http://schemas.openxmlformats.org/drawingml/2006/main" name="Office Theme">
+  <a:themeElements>
+    <a:clrScheme name="Office">
+      <a:dk1>
+        <a:sysClr val="windowText" lastClr="000000"/>
+      </a:dk1>
+      <a:lt1>
+        <a:sysClr val="window" lastClr="FFFFFF"/>
+      </a:lt1>
+      <a:dk2>
+        <a:srgbClr val="44546A"/>
+      </a:dk2>
+      <a:lt2>
+        <a:srgbClr val="E7E6E6"/>
+      </a:lt2>
+      <a:accent1>
+        <a:srgbClr val="4472C4"/>
+      </a:accent1>
+      <a:accent2>
+        <a:srgbClr val="ED7D31"/>
+      </a:accent2>
+      <a:accent3>
+        <a:srgbClr val="A5A5A5"/>
+      </a:accent3>
+      <a:accent4>
+        <a:srgbClr val="FFC000"/>
+      </a:accent4>
+      <a:accent5>
+        <a:srgbClr val="5B9BD5"/>
+      </a:accent5>
+      <a:accent6>
+        <a:srgbClr val="70AD47"/>
+      </a:accent6>
+      <a:hlink>
+        <a:srgbClr val="0563C1"/>
+      </a:hlink>
+      <a:folHlink>
+        <a:srgbClr val="954F72"/>
+      </a:folHlink>
+    </a:clrScheme>
+    <a:fontScheme name="Office">
+      <a:majorFont>
+        <a:latin typeface="Calibri Light" panose="020F0302020204030204"/>
+        <a:ea typeface=""/>
+        <a:cs typeface=""/>
+        <a:font script="Jpan" typeface="游ゴシック Light"/>
+        <a:font script="Hang" typeface="맑은 고딕"/>
+        <a:font script="Hans" typeface="等线 Light"/>
+        <a:font script="Hant" typeface="新細明體"/>
+        <a:font script="Arab" typeface="Times New Roman"/>
+        <a:font script="Hebr" typeface="Times New Roman"/>
+        <a:font script="Thai" typeface="Angsana New"/>
+        <a:font script="Ethi" typeface="Nyala"/>
+        <a:font script="Beng" typeface="Vrinda"/>
+        <a:font script="Gujr" typeface="Shruti"/>
+        <a:font script="Khmr" typeface="MoolBoran"/>
+        <a:font script="Knda" typeface="Tunga"/>
+        <a:font script="Guru" typeface="Raavi"/>
+        <a:font script="Cans" typeface="Euphemia"/>
+        <a:font script="Cher" typeface="Plantagenet Cherokee"/>
+        <a:font script="Yiii" typeface="Microsoft Yi Baiti"/>
+        <a:font script="Tibt" typeface="Microsoft Himalaya"/>
+        <a:font script="Thaa" typeface="MV Boli"/>
+        <a:font script="Deva" typeface="Mangal"/>
+        <a:font script="Telu" typeface="Gautami"/>
+        <a:font script="Taml" typeface="Latha"/>
+        <a:font script="Syrc" typeface="Estrangelo Edessa"/>
+        <a:font script="Orya" typeface="Kalinga"/>
+        <a:font script="Mlym" typeface="Kartika"/>
+        <a:font script="Laoo" typeface="DokChampa"/>
+        <a:font script="Sinh" typeface="Iskoola Pota"/>
+        <a:font script="Mong" typeface="Mongolian Baiti"/>
+        <a:font script="Viet" typeface="Times New Roman"/>
+        <a:font script="Uigh" typeface="Microsoft Uighur"/>
+        <a:font script="Geor" typeface="Sylfaen"/>
+        <a:font script="Armn" typeface="Arial"/>
+        <a:font script="Bugi" typeface="Leelawadee UI"/>
+        <a:font script="Bopo" typeface="Microsoft JhengHei"/>
+        <a:font script="Java" typeface="Javanese Text"/>
+        <a:font script="Lisu" typeface="Segoe UI"/>
+        <a:font script="Mymr" typeface="Myanmar Text"/>
+        <a:font script="Nkoo" typeface="Ebrima"/>
+        <a:font script="Olck" typeface="Nirmala UI"/>
+        <a:font script="Osma" typeface="Ebrima"/>
+        <a:font script="Phag" typeface="Phagspa"/>
+        <a:font script="Syrn" typeface="Estrangelo Edessa"/>
+        <a:font script="Syrj" typeface="Estrangelo Edessa"/>
+        <a:font script="Syre" typeface="Estrangelo Edessa"/>
+        <a:font script="Sora" typeface="Nirmala UI"/>
+        <a:font script="Tale" typeface="Microsoft Tai Le"/>
+        <a:font script="Talu" typeface="Microsoft New Tai Lue"/>
+        <a:font script="Tfng" typeface="Ebrima"/>
+      </a:majorFont>
+      <a:minorFont>
+        <a:latin typeface="Calibri" panose="020F0502020204030204"/>
+        <a:ea typeface=""/>
+        <a:cs typeface=""/>
+        <a:font script="Jpan" typeface="游ゴシック"/>
+        <a:font script="Hang" typeface="맑은 고딕"/>
+        <a:font script="Hans" typeface="等线"/>
+        <a:font script="Hant" typeface="新細明體"/>
+        <a:font script="Arab" typeface="Arial"/>
+        <a:font script="Hebr" typeface="Arial"/>
+        <a:font script="Thai" typeface="Cordia New"/>
+        <a:font script="Ethi" typeface="Nyala"/>
+        <a:font script="Beng" typeface="Vrinda"/>
+        <a:font script="Gujr" typeface="Shruti"/>
+        <a:font script="Khmr" typeface="DaunPenh"/>
+        <a:font script="Knda" typeface="Tunga"/>
+        <a:font script="Guru" typeface="Raavi"/>
+        <a:font script="Cans" typeface="Euphemia"/>
+        <a:font script="Cher" typeface="Plantagenet Cherokee"/>
+        <a:font script="Yiii" typeface="Microsoft Yi Baiti"/>
+        <a:font script="Tibt" typeface="Microsoft Himalaya"/>
+        <a:font script="Thaa" typeface="MV Boli"/>
+        <a:font script="Deva" typeface="Mangal"/>
+        <a:font script="Telu" typeface="Gautami"/>
+        <a:font script="Taml" typeface="Latha"/>
+        <a:font script="Syrc" typeface="Estrangelo Edessa"/>
+        <a:font script="Orya" typeface="Kalinga"/>
+        <a:font script="Mlym" typeface="Kartika"/>
+        <a:font script="Laoo" typeface="DokChampa"/>
+        <a:font script="Sinh" typeface="Iskoola Pota"/>
+        <a:font script="Mong" typeface="Mongolian Baiti"/>
+        <a:font script="Viet" typeface="Arial"/>
+        <a:font script="Uigh" typeface="Microsoft Uighur"/>
+        <a:font script="Geor" typeface="Sylfaen"/>
+        <a:font script="Armn" typeface="Arial"/>
+        <a:font script="Bugi" typeface="Leelawadee UI"/>
+        <a:font script="Bopo" typeface="Microsoft JhengHei"/>
+        <a:font script="Java" typeface="Javanese Text"/>
+        <a:font script="Lisu" typeface="Segoe UI"/>
+        <a:font script="Mymr" typeface="Myanmar Text"/>
+        <a:font script="Nkoo" typeface="Ebrima"/>
+        <a:font script="Olck" typeface="Nirmala UI"/>
+        <a:font script="Osma" typeface="Ebrima"/>
+        <a:font script="Phag" typeface="Phagspa"/>
+        <a:font script="Syrn" typeface="Estrangelo Edessa"/>
+        <a:font script="Syrj" typeface="Estrangelo Edessa"/>
+        <a:font script="Syre" typeface="Estrangelo Edessa"/>
+        <a:font script="Sora" typeface="Nirmala UI"/>
+        <a:font script="Tale" typeface="Microsoft Tai Le"/>
+        <a:font script="Talu" typeface="Microsoft New Tai Lue"/>
+        <a:font script="Tfng" typeface="Ebrima"/>
+      </a:minorFont>
+    </a:fontScheme>
+    <a:fmtScheme name="Office">
+      <a:fillStyleLst>
+        <a:solidFill>
+          <a:schemeClr val="phClr"/>
+        </a:solidFill>
+        <a:gradFill rotWithShape="1">
+          <a:gsLst>
+            <a:gs pos="0">
+              <a:schemeClr val="phClr">
+                <a:lumMod val="110000"/>
+                <a:satMod val="105000"/>
+                <a:tint val="67000"/>
+              </a:schemeClr>
+            </a:gs>
+            <a:gs pos="50000">
+              <a:schemeClr val="phClr">
+                <a:lumMod val="105000"/>
+                <a:satMod val="103000"/>
+                <a:tint val="73000"/>
+              </a:schemeClr>
+            </a:gs>
+            <a:gs pos="100000">
+              <a:schemeClr val="phClr">
+                <a:lumMod val="105000"/>
+                <a:satMod val="109000"/>
+                <a:tint val="81000"/>
+              </a:schemeClr>
+            </a:gs>
+          </a:gsLst>
+          <a:lin ang="5400000" scaled="0"/>
+        </a:gradFill>
+        <a:gradFill rotWithShape="1">
+          <a:gsLst>
+            <a:gs pos="0">
+              <a:schemeClr val="phClr">
+                <a:satMod val="103000"/>
+                <a:lumMod val="102000"/>
+                <a:tint val="94000"/>
+              </a:schemeClr>
+            </a:gs>
+            <a:gs pos="50000">
+              <a:schemeClr val="phClr">
+                <a:satMod val="110000"/>
+                <a:lumMod val="100000"/>
+                <a:shade val="100000"/>
+              </a:schemeClr>
+            </a:gs>
+            <a:gs pos="100000">
+              <a:schemeClr val="phClr">
+                <a:lumMod val="99000"/>
+                <a:satMod val="120000"/>
+                <a:shade val="78000"/>
+              </a:schemeClr>
+            </a:gs>
+          </a:gsLst>
+          <a:lin ang="5400000" scaled="0"/>
+        </a:gradFill>
+      </a:fillStyleLst>
+      <a:lnStyleLst>
+        <a:ln w="6350" cap="flat" cmpd="sng" algn="ctr">
+          <a:solidFill>
+            <a:schemeClr val="phClr"/>
+          </a:solidFill>
+          <a:prstDash val="solid"/>
+          <a:miter lim="800000"/>
+        </a:ln>
+        <a:ln w="12700" cap="flat" cmpd="sng" algn="ctr">
+          <a:solidFill>
+            <a:schemeClr val="phClr"/>
+          </a:solidFill>
+          <a:prstDash val="solid"/>
+          <a:miter lim="800000"/>
+        </a:ln>
+        <a:ln w="19050" cap="flat" cmpd="sng" algn="ctr">
+          <a:solidFill>
+            <a:schemeClr val="phClr"/>
+          </a:solidFill>
+          <a:prstDash val="solid"/>
+          <a:miter lim="800000"/>
+        </a:ln>
+      </a:lnStyleLst>
+      <a:effectStyleLst>
+        <a:effectStyle>
+          <a:effectLst/>
+        </a:effectStyle>
+        <a:effectStyle>
+          <a:effectLst/>
+        </a:effectStyle>
+        <a:effectStyle>
+          <a:effectLst>
+            <a:outerShdw blurRad="57150" dist="19050" dir="5400000" algn="ctr" rotWithShape="0">
+              <a:srgbClr val="000000">
+                <a:alpha val="63000"/>
+              </a:srgbClr>
+            </a:outerShdw>
+          </a:effectLst>
+        </a:effectStyle>
+      </a:effectStyleLst>
+      <a:bgFillStyleLst>
+        <a:solidFill>
+          <a:schemeClr val="phClr"/>
+        </a:solidFill>
+        <a:solidFill>
+          <a:schemeClr val="phClr">
+            <a:tint val="95000"/>
+            <a:satMod val="170000"/>
+          </a:schemeClr>
+        </a:solidFill>
+        <a:gradFill rotWithShape="1">
+          <a:gsLst>
+            <a:gs pos="0">
+              <a:schemeClr val="phClr">
+                <a:tint val="93000"/>
+                <a:satMod val="150000"/>
+                <a:shade val="98000"/>
+                <a:lumMod val="102000"/>
+              </a:schemeClr>
+            </a:gs>
+            <a:gs pos="50000">
+              <a:schemeClr val="phClr">
+                <a:tint val="98000"/>
+                <a:satMod val="130000"/>
+                <a:shade val="90000"/>
+                <a:lumMod val="103000"/>
+              </a:schemeClr>
+            </a:gs>
+            <a:gs pos="100000">
+              <a:schemeClr val="phClr">
+                <a:shade val="63000"/>
+                <a:satMod val="120000"/>
+              </a:schemeClr>
+            </a:gs>
+          </a:gsLst>
+          <a:lin ang="5400000" scaled="0"/>
+        </a:gradFill>
+      </a:bgFillStyleLst>
+    </a:fmtScheme>
+  </a:themeElements>
+  <a:objectDefaults/>
+  <a:extraClrSchemeLst/>
+  <a:extLst>
+    <a:ext uri="{05A4C25C-085E-4340-85A3-A5531E510DB2}">
+      <thm15:themeFamily xmlns:thm15="http://schemas.microsoft.com/office/thememl/2012/main" name="Office Theme" id="{62F939B6-93AF-4DB8-9C6B-D6C7DFDC589F}" vid="{4A3C46E8-61CC-4603-A589-7422A47A8E4A}"/>
+    </a:ext>
+  </a:extLst>
+</a:theme>
 </file>
</xml_diff>